<commit_message>
Mori modified the last part of result.
森さんのシミュレーション修正を入れました。
</commit_message>
<xml_diff>
--- a/math/Hakoniwa-time.pptx
+++ b/math/Hakoniwa-time.pptx
@@ -6,7 +6,7 @@
     <p:sldMasterId id="2147483815" r:id="rId2"/>
   </p:sldMasterIdLst>
   <p:notesMasterIdLst>
-    <p:notesMasterId r:id="rId17"/>
+    <p:notesMasterId r:id="rId18"/>
   </p:notesMasterIdLst>
   <p:sldIdLst>
     <p:sldId id="256" r:id="rId3"/>
@@ -22,7 +22,8 @@
     <p:sldId id="1357" r:id="rId13"/>
     <p:sldId id="1355" r:id="rId14"/>
     <p:sldId id="1350" r:id="rId15"/>
-    <p:sldId id="1356" r:id="rId16"/>
+    <p:sldId id="1358" r:id="rId16"/>
+    <p:sldId id="1356" r:id="rId17"/>
   </p:sldIdLst>
   <p:sldSz cx="12192000" cy="6858000"/>
   <p:notesSz cx="6797675" cy="9926638"/>
@@ -303,7 +304,7 @@
               <a:pPr>
                 <a:defRPr/>
               </a:pPr>
-              <a:t>2024/9/25</a:t>
+              <a:t>2024/9/26</a:t>
             </a:fld>
             <a:endParaRPr lang="ja-JP" altLang="en-US" dirty="0"/>
           </a:p>
@@ -988,7 +989,7 @@
           <a:p>
             <a:fld id="{1733E518-4B2E-46CC-A779-D7A67A1295D7}" type="datetimeFigureOut">
               <a:rPr kumimoji="1" lang="ja-JP" altLang="en-US" smtClean="0"/>
-              <a:t>2024/9/25</a:t>
+              <a:t>2024/9/26</a:t>
             </a:fld>
             <a:endParaRPr kumimoji="1" lang="ja-JP" altLang="en-US"/>
           </a:p>
@@ -1188,7 +1189,7 @@
           <a:p>
             <a:fld id="{1733E518-4B2E-46CC-A779-D7A67A1295D7}" type="datetimeFigureOut">
               <a:rPr kumimoji="1" lang="ja-JP" altLang="en-US" smtClean="0"/>
-              <a:t>2024/9/25</a:t>
+              <a:t>2024/9/26</a:t>
             </a:fld>
             <a:endParaRPr kumimoji="1" lang="ja-JP" altLang="en-US"/>
           </a:p>
@@ -1398,7 +1399,7 @@
           <a:p>
             <a:fld id="{1733E518-4B2E-46CC-A779-D7A67A1295D7}" type="datetimeFigureOut">
               <a:rPr kumimoji="1" lang="ja-JP" altLang="en-US" smtClean="0"/>
-              <a:t>2024/9/25</a:t>
+              <a:t>2024/9/26</a:t>
             </a:fld>
             <a:endParaRPr kumimoji="1" lang="ja-JP" altLang="en-US"/>
           </a:p>
@@ -3802,7 +3803,7 @@
           <a:p>
             <a:fld id="{1733E518-4B2E-46CC-A779-D7A67A1295D7}" type="datetimeFigureOut">
               <a:rPr kumimoji="1" lang="ja-JP" altLang="en-US" smtClean="0"/>
-              <a:t>2024/9/25</a:t>
+              <a:t>2024/9/26</a:t>
             </a:fld>
             <a:endParaRPr kumimoji="1" lang="ja-JP" altLang="en-US"/>
           </a:p>
@@ -5289,7 +5290,7 @@
           <a:p>
             <a:fld id="{1733E518-4B2E-46CC-A779-D7A67A1295D7}" type="datetimeFigureOut">
               <a:rPr kumimoji="1" lang="ja-JP" altLang="en-US" smtClean="0"/>
-              <a:t>2024/9/25</a:t>
+              <a:t>2024/9/26</a:t>
             </a:fld>
             <a:endParaRPr kumimoji="1" lang="ja-JP" altLang="en-US"/>
           </a:p>
@@ -5638,7 +5639,7 @@
           <a:p>
             <a:fld id="{1733E518-4B2E-46CC-A779-D7A67A1295D7}" type="datetimeFigureOut">
               <a:rPr kumimoji="1" lang="ja-JP" altLang="en-US" smtClean="0"/>
-              <a:t>2024/9/25</a:t>
+              <a:t>2024/9/26</a:t>
             </a:fld>
             <a:endParaRPr kumimoji="1" lang="ja-JP" altLang="en-US"/>
           </a:p>
@@ -6121,7 +6122,7 @@
           <a:p>
             <a:fld id="{1733E518-4B2E-46CC-A779-D7A67A1295D7}" type="datetimeFigureOut">
               <a:rPr kumimoji="1" lang="ja-JP" altLang="en-US" smtClean="0"/>
-              <a:t>2024/9/25</a:t>
+              <a:t>2024/9/26</a:t>
             </a:fld>
             <a:endParaRPr kumimoji="1" lang="ja-JP" altLang="en-US"/>
           </a:p>
@@ -6238,7 +6239,7 @@
           <a:p>
             <a:fld id="{1733E518-4B2E-46CC-A779-D7A67A1295D7}" type="datetimeFigureOut">
               <a:rPr kumimoji="1" lang="ja-JP" altLang="en-US" smtClean="0"/>
-              <a:t>2024/9/25</a:t>
+              <a:t>2024/9/26</a:t>
             </a:fld>
             <a:endParaRPr kumimoji="1" lang="ja-JP" altLang="en-US"/>
           </a:p>
@@ -6333,7 +6334,7 @@
           <a:p>
             <a:fld id="{1733E518-4B2E-46CC-A779-D7A67A1295D7}" type="datetimeFigureOut">
               <a:rPr kumimoji="1" lang="ja-JP" altLang="en-US" smtClean="0"/>
-              <a:t>2024/9/25</a:t>
+              <a:t>2024/9/26</a:t>
             </a:fld>
             <a:endParaRPr kumimoji="1" lang="ja-JP" altLang="en-US"/>
           </a:p>
@@ -6640,7 +6641,7 @@
           <a:p>
             <a:fld id="{1733E518-4B2E-46CC-A779-D7A67A1295D7}" type="datetimeFigureOut">
               <a:rPr kumimoji="1" lang="ja-JP" altLang="en-US" smtClean="0"/>
-              <a:t>2024/9/25</a:t>
+              <a:t>2024/9/26</a:t>
             </a:fld>
             <a:endParaRPr kumimoji="1" lang="ja-JP" altLang="en-US"/>
           </a:p>
@@ -6892,7 +6893,7 @@
           <a:p>
             <a:fld id="{1733E518-4B2E-46CC-A779-D7A67A1295D7}" type="datetimeFigureOut">
               <a:rPr kumimoji="1" lang="ja-JP" altLang="en-US" smtClean="0"/>
-              <a:t>2024/9/25</a:t>
+              <a:t>2024/9/26</a:t>
             </a:fld>
             <a:endParaRPr kumimoji="1" lang="ja-JP" altLang="en-US"/>
           </a:p>
@@ -7135,7 +7136,7 @@
           <a:p>
             <a:fld id="{1733E518-4B2E-46CC-A779-D7A67A1295D7}" type="datetimeFigureOut">
               <a:rPr kumimoji="1" lang="ja-JP" altLang="en-US" smtClean="0"/>
-              <a:t>2024/9/25</a:t>
+              <a:t>2024/9/26</a:t>
             </a:fld>
             <a:endParaRPr kumimoji="1" lang="ja-JP" altLang="en-US"/>
           </a:p>
@@ -8328,6 +8329,7 @@
           <a:bodyPr/>
           <a:lstStyle/>
           <a:p>
+            <a:pPr algn="r"/>
             <a:r>
               <a:rPr lang="ja-JP" altLang="en-US"/>
               <a:t>合同会社箱庭ラボ</a:t>
@@ -8335,9 +8337,18 @@
             <a:endParaRPr lang="en-US" altLang="ja-JP" dirty="0"/>
           </a:p>
           <a:p>
+            <a:pPr algn="r"/>
             <a:r>
               <a:rPr kumimoji="1" lang="ja-JP" altLang="en-US"/>
               <a:t>　森崇、平鍋</a:t>
+            </a:r>
+            <a:endParaRPr kumimoji="1" lang="en-US" altLang="ja-JP"/>
+          </a:p>
+          <a:p>
+            <a:pPr algn="r"/>
+            <a:r>
+              <a:rPr lang="en-US" altLang="ja-JP"/>
+              <a:t>2024/9/26</a:t>
             </a:r>
             <a:endParaRPr kumimoji="1" lang="en-US" altLang="ja-JP" dirty="0"/>
           </a:p>
@@ -9817,12 +9828,12 @@
               <a:t>参照： </a:t>
             </a:r>
             <a:r>
-              <a:rPr kumimoji="1" lang="en-US" altLang="ja-JP">
+              <a:rPr kumimoji="1" lang="en-US" altLang="ja-JP" dirty="0">
                 <a:hlinkClick r:id="rId4"/>
               </a:rPr>
               <a:t>https://github.com/toppers/hakoniwa-core-cpp-client/tree/main/math</a:t>
             </a:r>
-            <a:endParaRPr kumimoji="1" lang="en-US" altLang="ja-JP"/>
+            <a:endParaRPr kumimoji="1" lang="en-US" altLang="ja-JP" dirty="0"/>
           </a:p>
         </p:txBody>
       </p:sp>
@@ -12085,9 +12096,8 @@
             <a:avLst/>
           </a:prstGeom>
           <a:solidFill>
-            <a:schemeClr val="accent2">
-              <a:lumMod val="20000"/>
-              <a:lumOff val="80000"/>
+            <a:schemeClr val="bg1">
+              <a:lumMod val="75000"/>
             </a:schemeClr>
           </a:solidFill>
           <a:ln>
@@ -12377,127 +12387,6 @@
                 <a:ea typeface="Meiryo UI" panose="020B0604030504040204" pitchFamily="34" charset="-128"/>
               </a:rPr>
               <a:t>アセット時刻</a:t>
-            </a:r>
-          </a:p>
-        </p:txBody>
-      </p:sp>
-      <p:sp>
-        <p:nvSpPr>
-          <p:cNvPr id="47" name="テキスト ボックス 46">
-            <a:extLst>
-              <a:ext uri="{FF2B5EF4-FFF2-40B4-BE49-F238E27FC236}">
-                <a16:creationId xmlns:a16="http://schemas.microsoft.com/office/drawing/2014/main" id="{2E7EE39B-65B3-0077-4833-DB0C6F9C66F2}"/>
-              </a:ext>
-            </a:extLst>
-          </p:cNvPr>
-          <p:cNvSpPr txBox="1"/>
-          <p:nvPr/>
-        </p:nvSpPr>
-        <p:spPr>
-          <a:xfrm>
-            <a:off x="1300667" y="1897099"/>
-            <a:ext cx="2158326" cy="584775"/>
-          </a:xfrm>
-          <a:prstGeom prst="rect">
-            <a:avLst/>
-          </a:prstGeom>
-          <a:noFill/>
-        </p:spPr>
-        <p:txBody>
-          <a:bodyPr wrap="square" rtlCol="0">
-            <a:spAutoFit/>
-          </a:bodyPr>
-          <a:lstStyle/>
-          <a:p>
-            <a:pPr algn="ctr"/>
-            <a:r>
-              <a:rPr kumimoji="1" lang="ja-JP" altLang="en-US" sz="1600">
-                <a:solidFill>
-                  <a:srgbClr val="FF0000"/>
-                </a:solidFill>
-                <a:latin typeface="Meiryo UI" panose="020B0604030504040204" pitchFamily="34" charset="-128"/>
-                <a:ea typeface="Meiryo UI" panose="020B0604030504040204" pitchFamily="34" charset="-128"/>
-              </a:rPr>
-              <a:t>アセットのみ</a:t>
-            </a:r>
-            <a:endParaRPr kumimoji="1" lang="en-US" altLang="ja-JP" sz="1600" dirty="0">
-              <a:solidFill>
-                <a:srgbClr val="FF0000"/>
-              </a:solidFill>
-              <a:latin typeface="Meiryo UI" panose="020B0604030504040204" pitchFamily="34" charset="-128"/>
-              <a:ea typeface="Meiryo UI" panose="020B0604030504040204" pitchFamily="34" charset="-128"/>
-            </a:endParaRPr>
-          </a:p>
-          <a:p>
-            <a:pPr algn="ctr"/>
-            <a:r>
-              <a:rPr lang="ja-JP" altLang="en-US" sz="1600">
-                <a:solidFill>
-                  <a:srgbClr val="FF0000"/>
-                </a:solidFill>
-                <a:latin typeface="Meiryo UI" panose="020B0604030504040204" pitchFamily="34" charset="-128"/>
-                <a:ea typeface="Meiryo UI" panose="020B0604030504040204" pitchFamily="34" charset="-128"/>
-              </a:rPr>
-              <a:t>時間を進める領域</a:t>
-            </a:r>
-            <a:endParaRPr kumimoji="1" lang="ja-JP" altLang="en-US" sz="1600">
-              <a:solidFill>
-                <a:srgbClr val="FF0000"/>
-              </a:solidFill>
-              <a:latin typeface="Meiryo UI" panose="020B0604030504040204" pitchFamily="34" charset="-128"/>
-              <a:ea typeface="Meiryo UI" panose="020B0604030504040204" pitchFamily="34" charset="-128"/>
-            </a:endParaRPr>
-          </a:p>
-        </p:txBody>
-      </p:sp>
-      <p:sp>
-        <p:nvSpPr>
-          <p:cNvPr id="48" name="テキスト ボックス 47">
-            <a:extLst>
-              <a:ext uri="{FF2B5EF4-FFF2-40B4-BE49-F238E27FC236}">
-                <a16:creationId xmlns:a16="http://schemas.microsoft.com/office/drawing/2014/main" id="{0D63BEE7-4BBF-AA58-1F3C-C4C3CE32A568}"/>
-              </a:ext>
-            </a:extLst>
-          </p:cNvPr>
-          <p:cNvSpPr txBox="1"/>
-          <p:nvPr/>
-        </p:nvSpPr>
-        <p:spPr>
-          <a:xfrm>
-            <a:off x="1734779" y="5101210"/>
-            <a:ext cx="3854225" cy="338554"/>
-          </a:xfrm>
-          <a:prstGeom prst="rect">
-            <a:avLst/>
-          </a:prstGeom>
-          <a:noFill/>
-        </p:spPr>
-        <p:txBody>
-          <a:bodyPr wrap="square" rtlCol="0">
-            <a:spAutoFit/>
-          </a:bodyPr>
-          <a:lstStyle/>
-          <a:p>
-            <a:pPr algn="ctr"/>
-            <a:r>
-              <a:rPr lang="ja-JP" altLang="en-US" sz="1600">
-                <a:solidFill>
-                  <a:srgbClr val="FF0000"/>
-                </a:solidFill>
-                <a:latin typeface="Meiryo UI" panose="020B0604030504040204" pitchFamily="34" charset="-128"/>
-                <a:ea typeface="Meiryo UI" panose="020B0604030504040204" pitchFamily="34" charset="-128"/>
-              </a:rPr>
-              <a:t>コア</a:t>
-            </a:r>
-            <a:r>
-              <a:rPr kumimoji="1" lang="ja-JP" altLang="en-US" sz="1600">
-                <a:solidFill>
-                  <a:srgbClr val="FF0000"/>
-                </a:solidFill>
-                <a:latin typeface="Meiryo UI" panose="020B0604030504040204" pitchFamily="34" charset="-128"/>
-                <a:ea typeface="Meiryo UI" panose="020B0604030504040204" pitchFamily="34" charset="-128"/>
-              </a:rPr>
-              <a:t>のみ時間を進める領域</a:t>
             </a:r>
           </a:p>
         </p:txBody>
@@ -12998,6 +12887,210 @@
           </a:p>
         </p:txBody>
       </p:sp>
+      <p:sp>
+        <p:nvSpPr>
+          <p:cNvPr id="3" name="テキスト ボックス 2">
+            <a:extLst>
+              <a:ext uri="{FF2B5EF4-FFF2-40B4-BE49-F238E27FC236}">
+                <a16:creationId xmlns:a16="http://schemas.microsoft.com/office/drawing/2014/main" id="{75ABB8A8-B2D5-FF2F-C9B1-4B26D0C4FF06}"/>
+              </a:ext>
+            </a:extLst>
+          </p:cNvPr>
+          <p:cNvSpPr txBox="1"/>
+          <p:nvPr/>
+        </p:nvSpPr>
+        <p:spPr>
+          <a:xfrm>
+            <a:off x="2618307" y="4543802"/>
+            <a:ext cx="3034930" cy="830997"/>
+          </a:xfrm>
+          <a:prstGeom prst="rect">
+            <a:avLst/>
+          </a:prstGeom>
+          <a:noFill/>
+        </p:spPr>
+        <p:txBody>
+          <a:bodyPr wrap="square" rtlCol="0">
+            <a:spAutoFit/>
+          </a:bodyPr>
+          <a:lstStyle/>
+          <a:p>
+            <a:pPr algn="ctr"/>
+            <a:r>
+              <a:rPr kumimoji="1" lang="ja-JP" altLang="en-US" sz="1600">
+                <a:solidFill>
+                  <a:srgbClr val="FF0000"/>
+                </a:solidFill>
+                <a:latin typeface="Meiryo UI" panose="020B0604030504040204" pitchFamily="34" charset="-128"/>
+                <a:ea typeface="Meiryo UI" panose="020B0604030504040204" pitchFamily="34" charset="-128"/>
+              </a:rPr>
+              <a:t>アセット時間が進んでいる</a:t>
+            </a:r>
+            <a:endParaRPr kumimoji="1" lang="en-US" altLang="ja-JP" sz="1600" dirty="0">
+              <a:solidFill>
+                <a:srgbClr val="FF0000"/>
+              </a:solidFill>
+              <a:latin typeface="Meiryo UI" panose="020B0604030504040204" pitchFamily="34" charset="-128"/>
+              <a:ea typeface="Meiryo UI" panose="020B0604030504040204" pitchFamily="34" charset="-128"/>
+            </a:endParaRPr>
+          </a:p>
+          <a:p>
+            <a:pPr algn="ctr"/>
+            <a:r>
+              <a:rPr kumimoji="1" lang="en-US" altLang="ja-JP" sz="1600" dirty="0">
+                <a:solidFill>
+                  <a:srgbClr val="FF0000"/>
+                </a:solidFill>
+                <a:latin typeface="Meiryo UI" panose="020B0604030504040204" pitchFamily="34" charset="-128"/>
+                <a:ea typeface="Meiryo UI" panose="020B0604030504040204" pitchFamily="34" charset="-128"/>
+              </a:rPr>
+              <a:t>(</a:t>
+            </a:r>
+            <a:r>
+              <a:rPr kumimoji="1" lang="ja-JP" altLang="en-US" sz="1600">
+                <a:solidFill>
+                  <a:srgbClr val="FF0000"/>
+                </a:solidFill>
+                <a:latin typeface="Meiryo UI" panose="020B0604030504040204" pitchFamily="34" charset="-128"/>
+                <a:ea typeface="Meiryo UI" panose="020B0604030504040204" pitchFamily="34" charset="-128"/>
+              </a:rPr>
+              <a:t>この状態には</a:t>
+            </a:r>
+            <a:endParaRPr kumimoji="1" lang="en-US" altLang="ja-JP" sz="1600" dirty="0">
+              <a:solidFill>
+                <a:srgbClr val="FF0000"/>
+              </a:solidFill>
+              <a:latin typeface="Meiryo UI" panose="020B0604030504040204" pitchFamily="34" charset="-128"/>
+              <a:ea typeface="Meiryo UI" panose="020B0604030504040204" pitchFamily="34" charset="-128"/>
+            </a:endParaRPr>
+          </a:p>
+          <a:p>
+            <a:pPr algn="ctr"/>
+            <a:r>
+              <a:rPr kumimoji="1" lang="ja-JP" altLang="en-US" sz="1600">
+                <a:solidFill>
+                  <a:srgbClr val="FF0000"/>
+                </a:solidFill>
+                <a:latin typeface="Meiryo UI" panose="020B0604030504040204" pitchFamily="34" charset="-128"/>
+                <a:ea typeface="Meiryo UI" panose="020B0604030504040204" pitchFamily="34" charset="-128"/>
+              </a:rPr>
+              <a:t>決してしない）</a:t>
+            </a:r>
+          </a:p>
+        </p:txBody>
+      </p:sp>
+      <p:sp>
+        <p:nvSpPr>
+          <p:cNvPr id="5" name="テキスト ボックス 4">
+            <a:extLst>
+              <a:ext uri="{FF2B5EF4-FFF2-40B4-BE49-F238E27FC236}">
+                <a16:creationId xmlns:a16="http://schemas.microsoft.com/office/drawing/2014/main" id="{388F9E81-577C-D807-0F0F-B29DFFB16E7E}"/>
+              </a:ext>
+            </a:extLst>
+          </p:cNvPr>
+          <p:cNvSpPr txBox="1"/>
+          <p:nvPr/>
+        </p:nvSpPr>
+        <p:spPr>
+          <a:xfrm>
+            <a:off x="970221" y="1869708"/>
+            <a:ext cx="3034930" cy="1077218"/>
+          </a:xfrm>
+          <a:prstGeom prst="rect">
+            <a:avLst/>
+          </a:prstGeom>
+          <a:noFill/>
+        </p:spPr>
+        <p:txBody>
+          <a:bodyPr wrap="square" rtlCol="0">
+            <a:spAutoFit/>
+          </a:bodyPr>
+          <a:lstStyle/>
+          <a:p>
+            <a:pPr algn="ctr"/>
+            <a:r>
+              <a:rPr kumimoji="1" lang="ja-JP" altLang="en-US" sz="1600">
+                <a:solidFill>
+                  <a:srgbClr val="FF0000"/>
+                </a:solidFill>
+                <a:latin typeface="Meiryo UI" panose="020B0604030504040204" pitchFamily="34" charset="-128"/>
+                <a:ea typeface="Meiryo UI" panose="020B0604030504040204" pitchFamily="34" charset="-128"/>
+              </a:rPr>
+              <a:t>箱庭時刻が許容を</a:t>
+            </a:r>
+            <a:endParaRPr kumimoji="1" lang="en-US" altLang="ja-JP" sz="1600" dirty="0">
+              <a:solidFill>
+                <a:srgbClr val="FF0000"/>
+              </a:solidFill>
+              <a:latin typeface="Meiryo UI" panose="020B0604030504040204" pitchFamily="34" charset="-128"/>
+              <a:ea typeface="Meiryo UI" panose="020B0604030504040204" pitchFamily="34" charset="-128"/>
+            </a:endParaRPr>
+          </a:p>
+          <a:p>
+            <a:pPr algn="ctr"/>
+            <a:r>
+              <a:rPr kumimoji="1" lang="ja-JP" altLang="en-US" sz="1600">
+                <a:solidFill>
+                  <a:srgbClr val="FF0000"/>
+                </a:solidFill>
+                <a:latin typeface="Meiryo UI" panose="020B0604030504040204" pitchFamily="34" charset="-128"/>
+                <a:ea typeface="Meiryo UI" panose="020B0604030504040204" pitchFamily="34" charset="-128"/>
+              </a:rPr>
+              <a:t>超えて進んでいる</a:t>
+            </a:r>
+            <a:endParaRPr kumimoji="1" lang="en-US" altLang="ja-JP" sz="1600" dirty="0">
+              <a:solidFill>
+                <a:srgbClr val="FF0000"/>
+              </a:solidFill>
+              <a:latin typeface="Meiryo UI" panose="020B0604030504040204" pitchFamily="34" charset="-128"/>
+              <a:ea typeface="Meiryo UI" panose="020B0604030504040204" pitchFamily="34" charset="-128"/>
+            </a:endParaRPr>
+          </a:p>
+          <a:p>
+            <a:pPr algn="ctr"/>
+            <a:r>
+              <a:rPr kumimoji="1" lang="en-US" altLang="ja-JP" sz="1600" dirty="0">
+                <a:solidFill>
+                  <a:srgbClr val="FF0000"/>
+                </a:solidFill>
+                <a:latin typeface="Meiryo UI" panose="020B0604030504040204" pitchFamily="34" charset="-128"/>
+                <a:ea typeface="Meiryo UI" panose="020B0604030504040204" pitchFamily="34" charset="-128"/>
+              </a:rPr>
+              <a:t>(</a:t>
+            </a:r>
+            <a:r>
+              <a:rPr kumimoji="1" lang="ja-JP" altLang="en-US" sz="1600">
+                <a:solidFill>
+                  <a:srgbClr val="FF0000"/>
+                </a:solidFill>
+                <a:latin typeface="Meiryo UI" panose="020B0604030504040204" pitchFamily="34" charset="-128"/>
+                <a:ea typeface="Meiryo UI" panose="020B0604030504040204" pitchFamily="34" charset="-128"/>
+              </a:rPr>
+              <a:t>この状態には</a:t>
+            </a:r>
+            <a:endParaRPr kumimoji="1" lang="en-US" altLang="ja-JP" sz="1600" dirty="0">
+              <a:solidFill>
+                <a:srgbClr val="FF0000"/>
+              </a:solidFill>
+              <a:latin typeface="Meiryo UI" panose="020B0604030504040204" pitchFamily="34" charset="-128"/>
+              <a:ea typeface="Meiryo UI" panose="020B0604030504040204" pitchFamily="34" charset="-128"/>
+            </a:endParaRPr>
+          </a:p>
+          <a:p>
+            <a:pPr algn="ctr"/>
+            <a:r>
+              <a:rPr kumimoji="1" lang="ja-JP" altLang="en-US" sz="1600">
+                <a:solidFill>
+                  <a:srgbClr val="FF0000"/>
+                </a:solidFill>
+                <a:latin typeface="Meiryo UI" panose="020B0604030504040204" pitchFamily="34" charset="-128"/>
+                <a:ea typeface="Meiryo UI" panose="020B0604030504040204" pitchFamily="34" charset="-128"/>
+              </a:rPr>
+              <a:t>決してしない）</a:t>
+            </a:r>
+          </a:p>
+        </p:txBody>
+      </p:sp>
     </p:spTree>
     <p:extLst>
       <p:ext uri="{BB962C8B-B14F-4D97-AF65-F5344CB8AC3E}">
@@ -13016,7 +13109,13 @@
   <p:cSld>
     <p:spTree>
       <p:nvGrpSpPr>
-        <p:cNvPr id="1" name=""/>
+        <p:cNvPr id="1" name="">
+          <a:extLst>
+            <a:ext uri="{FF2B5EF4-FFF2-40B4-BE49-F238E27FC236}">
+              <a16:creationId xmlns:a16="http://schemas.microsoft.com/office/drawing/2014/main" id="{19631050-ED9F-9DC3-7587-9FFCE926576F}"/>
+            </a:ext>
+          </a:extLst>
+        </p:cNvPr>
         <p:cNvGrpSpPr/>
         <p:nvPr/>
       </p:nvGrpSpPr>
@@ -13030,10 +13129,10 @@
       </p:grpSpPr>
       <p:pic>
         <p:nvPicPr>
-          <p:cNvPr id="6" name="コンテンツ プレースホルダー 5" descr="グラフ, 折れ線グラフ&#10;&#10;自動的に生成された説明">
+          <p:cNvPr id="11" name="コンテンツ プレースホルダー 10" descr="グラフ, 折れ線グラフ&#10;&#10;自動的に生成された説明">
             <a:extLst>
               <a:ext uri="{FF2B5EF4-FFF2-40B4-BE49-F238E27FC236}">
-                <a16:creationId xmlns:a16="http://schemas.microsoft.com/office/drawing/2014/main" id="{CA66B7BA-C62E-137C-1406-FFFF33E7C9B7}"/>
+                <a16:creationId xmlns:a16="http://schemas.microsoft.com/office/drawing/2014/main" id="{243DD0AA-E156-DC36-A321-8B16E5626F13}"/>
               </a:ext>
             </a:extLst>
           </p:cNvPr>
@@ -13058,8 +13157,8 @@
         </p:blipFill>
         <p:spPr>
           <a:xfrm>
-            <a:off x="994042" y="836712"/>
-            <a:ext cx="9926494" cy="5876622"/>
+            <a:off x="1307468" y="908720"/>
+            <a:ext cx="9577064" cy="5703414"/>
           </a:xfrm>
         </p:spPr>
       </p:pic>
@@ -13068,7 +13167,7 @@
           <p:cNvPr id="4" name="スライド番号プレースホルダー 3">
             <a:extLst>
               <a:ext uri="{FF2B5EF4-FFF2-40B4-BE49-F238E27FC236}">
-                <a16:creationId xmlns:a16="http://schemas.microsoft.com/office/drawing/2014/main" id="{C0D18711-307B-EED6-D3EE-9AE1B2D4E6A0}"/>
+                <a16:creationId xmlns:a16="http://schemas.microsoft.com/office/drawing/2014/main" id="{2AFD3D4B-09EC-347B-0592-B0D0F6144B99}"/>
               </a:ext>
             </a:extLst>
           </p:cNvPr>
@@ -13109,7 +13208,7 @@
           <p:cNvPr id="2" name="タイトル 1">
             <a:extLst>
               <a:ext uri="{FF2B5EF4-FFF2-40B4-BE49-F238E27FC236}">
-                <a16:creationId xmlns:a16="http://schemas.microsoft.com/office/drawing/2014/main" id="{02109332-3ED3-242C-2B0E-8FB88D4B9B9F}"/>
+                <a16:creationId xmlns:a16="http://schemas.microsoft.com/office/drawing/2014/main" id="{21AEB537-AF81-9BA5-B944-16DF345A7DF0}"/>
               </a:ext>
             </a:extLst>
           </p:cNvPr>
@@ -13137,7 +13236,7 @@
           <p:cNvPr id="10" name="テキスト ボックス 9">
             <a:extLst>
               <a:ext uri="{FF2B5EF4-FFF2-40B4-BE49-F238E27FC236}">
-                <a16:creationId xmlns:a16="http://schemas.microsoft.com/office/drawing/2014/main" id="{579DDCB6-464E-481E-0A02-611387EAF6C2}"/>
+                <a16:creationId xmlns:a16="http://schemas.microsoft.com/office/drawing/2014/main" id="{A3291E1F-9906-59A9-8851-B36B253E7453}"/>
               </a:ext>
             </a:extLst>
           </p:cNvPr>
@@ -13146,8 +13245,8 @@
         </p:nvSpPr>
         <p:spPr>
           <a:xfrm>
-            <a:off x="3071664" y="1412776"/>
-            <a:ext cx="1208985" cy="738664"/>
+            <a:off x="3359696" y="1484784"/>
+            <a:ext cx="1210524" cy="738664"/>
           </a:xfrm>
           <a:prstGeom prst="rect">
             <a:avLst/>
@@ -13170,6 +13269,257 @@
           <a:lstStyle/>
           <a:p>
             <a:r>
+              <a:rPr kumimoji="1" lang="en-US" altLang="ja-JP" sz="1400" dirty="0"/>
+              <a:t>10 Assets</a:t>
+            </a:r>
+          </a:p>
+          <a:p>
+            <a:r>
+              <a:rPr lang="en-US" altLang="ja-JP" sz="1400" dirty="0">
+                <a:latin typeface="Times New Roman" panose="02020603050405020304" pitchFamily="18" charset="0"/>
+                <a:cs typeface="Times New Roman" panose="02020603050405020304" pitchFamily="18" charset="0"/>
+              </a:rPr>
+              <a:t>ΔT     = 10 </a:t>
+            </a:r>
+            <a:r>
+              <a:rPr lang="en-US" altLang="ja-JP" sz="1400" dirty="0" err="1">
+                <a:latin typeface="Times New Roman" panose="02020603050405020304" pitchFamily="18" charset="0"/>
+                <a:cs typeface="Times New Roman" panose="02020603050405020304" pitchFamily="18" charset="0"/>
+              </a:rPr>
+              <a:t>ms</a:t>
+            </a:r>
+            <a:endParaRPr kumimoji="1" lang="ja-JP" altLang="en-US" sz="1400">
+              <a:latin typeface="Times New Roman" panose="02020603050405020304" pitchFamily="18" charset="0"/>
+              <a:cs typeface="Times New Roman" panose="02020603050405020304" pitchFamily="18" charset="0"/>
+            </a:endParaRPr>
+          </a:p>
+          <a:p>
+            <a:r>
+              <a:rPr lang="en-US" altLang="ja-JP" sz="1400" dirty="0" err="1">
+                <a:latin typeface="Times New Roman" panose="02020603050405020304" pitchFamily="18" charset="0"/>
+                <a:cs typeface="Times New Roman" panose="02020603050405020304" pitchFamily="18" charset="0"/>
+              </a:rPr>
+              <a:t>d</a:t>
+            </a:r>
+            <a:r>
+              <a:rPr lang="en-US" altLang="ja-JP" sz="1400" baseline="-25000" dirty="0" err="1">
+                <a:latin typeface="Times New Roman" panose="02020603050405020304" pitchFamily="18" charset="0"/>
+                <a:cs typeface="Times New Roman" panose="02020603050405020304" pitchFamily="18" charset="0"/>
+              </a:rPr>
+              <a:t>_max</a:t>
+            </a:r>
+            <a:r>
+              <a:rPr lang="en-US" altLang="ja-JP" sz="1400" dirty="0">
+                <a:latin typeface="Times New Roman" panose="02020603050405020304" pitchFamily="18" charset="0"/>
+                <a:cs typeface="Times New Roman" panose="02020603050405020304" pitchFamily="18" charset="0"/>
+              </a:rPr>
+              <a:t>= 100 </a:t>
+            </a:r>
+            <a:r>
+              <a:rPr lang="en-US" altLang="ja-JP" sz="1400" dirty="0" err="1">
+                <a:latin typeface="Times New Roman" panose="02020603050405020304" pitchFamily="18" charset="0"/>
+                <a:cs typeface="Times New Roman" panose="02020603050405020304" pitchFamily="18" charset="0"/>
+              </a:rPr>
+              <a:t>ms</a:t>
+            </a:r>
+            <a:endParaRPr lang="en-US" altLang="ja-JP" sz="1400" dirty="0">
+              <a:latin typeface="Times New Roman" panose="02020603050405020304" pitchFamily="18" charset="0"/>
+              <a:cs typeface="Times New Roman" panose="02020603050405020304" pitchFamily="18" charset="0"/>
+            </a:endParaRPr>
+          </a:p>
+        </p:txBody>
+      </p:sp>
+    </p:spTree>
+    <p:extLst>
+      <p:ext uri="{BB962C8B-B14F-4D97-AF65-F5344CB8AC3E}">
+        <p14:creationId xmlns:p14="http://schemas.microsoft.com/office/powerpoint/2010/main" val="2422905503"/>
+      </p:ext>
+    </p:extLst>
+  </p:cSld>
+  <p:clrMapOvr>
+    <a:masterClrMapping/>
+  </p:clrMapOvr>
+</p:sld>
+</file>
+
+<file path=ppt/slides/slide15.xml><?xml version="1.0" encoding="utf-8"?>
+<p:sld xmlns:a="http://schemas.openxmlformats.org/drawingml/2006/main" xmlns:r="http://schemas.openxmlformats.org/officeDocument/2006/relationships" xmlns:p="http://schemas.openxmlformats.org/presentationml/2006/main">
+  <p:cSld>
+    <p:spTree>
+      <p:nvGrpSpPr>
+        <p:cNvPr id="1" name=""/>
+        <p:cNvGrpSpPr/>
+        <p:nvPr/>
+      </p:nvGrpSpPr>
+      <p:grpSpPr>
+        <a:xfrm>
+          <a:off x="0" y="0"/>
+          <a:ext cx="0" cy="0"/>
+          <a:chOff x="0" y="0"/>
+          <a:chExt cx="0" cy="0"/>
+        </a:xfrm>
+      </p:grpSpPr>
+      <p:pic>
+        <p:nvPicPr>
+          <p:cNvPr id="8" name="図 7" descr="グラフ, 折れ線グラフ&#10;&#10;自動的に生成された説明">
+            <a:extLst>
+              <a:ext uri="{FF2B5EF4-FFF2-40B4-BE49-F238E27FC236}">
+                <a16:creationId xmlns:a16="http://schemas.microsoft.com/office/drawing/2014/main" id="{F3BC0BEF-26E0-5C72-BF5B-C00717779E60}"/>
+              </a:ext>
+            </a:extLst>
+          </p:cNvPr>
+          <p:cNvPicPr>
+            <a:picLocks noChangeAspect="1"/>
+          </p:cNvPicPr>
+          <p:nvPr/>
+        </p:nvPicPr>
+        <p:blipFill>
+          <a:blip r:embed="rId2">
+            <a:extLst>
+              <a:ext uri="{28A0092B-C50C-407E-A947-70E740481C1C}">
+                <a14:useLocalDpi xmlns:a14="http://schemas.microsoft.com/office/drawing/2010/main" val="0"/>
+              </a:ext>
+            </a:extLst>
+          </a:blip>
+          <a:stretch>
+            <a:fillRect/>
+          </a:stretch>
+        </p:blipFill>
+        <p:spPr>
+          <a:xfrm>
+            <a:off x="863966" y="836712"/>
+            <a:ext cx="10272594" cy="6029109"/>
+          </a:xfrm>
+          <a:prstGeom prst="rect">
+            <a:avLst/>
+          </a:prstGeom>
+        </p:spPr>
+      </p:pic>
+      <p:sp>
+        <p:nvSpPr>
+          <p:cNvPr id="4" name="スライド番号プレースホルダー 3">
+            <a:extLst>
+              <a:ext uri="{FF2B5EF4-FFF2-40B4-BE49-F238E27FC236}">
+                <a16:creationId xmlns:a16="http://schemas.microsoft.com/office/drawing/2014/main" id="{C0D18711-307B-EED6-D3EE-9AE1B2D4E6A0}"/>
+              </a:ext>
+            </a:extLst>
+          </p:cNvPr>
+          <p:cNvSpPr>
+            <a:spLocks noGrp="1"/>
+          </p:cNvSpPr>
+          <p:nvPr>
+            <p:ph type="sldNum" sz="quarter" idx="4"/>
+          </p:nvPr>
+        </p:nvSpPr>
+        <p:spPr/>
+        <p:txBody>
+          <a:bodyPr/>
+          <a:lstStyle/>
+          <a:p>
+            <a:pPr algn="r">
+              <a:defRPr/>
+            </a:pPr>
+            <a:fld id="{E17FD244-5B26-4792-B537-EF0BE56E30E9}" type="slidenum">
+              <a:rPr lang="ja-JP" altLang="en-US" sz="2800" smtClean="0">
+                <a:latin typeface="Meiryo UI" panose="020B0604030504040204" pitchFamily="34" charset="-128"/>
+                <a:ea typeface="Meiryo UI" panose="020B0604030504040204" pitchFamily="34" charset="-128"/>
+              </a:rPr>
+              <a:pPr algn="r">
+                <a:defRPr/>
+              </a:pPr>
+              <a:t>15</a:t>
+            </a:fld>
+            <a:endParaRPr lang="ja-JP" altLang="en-US" sz="2800" dirty="0">
+              <a:latin typeface="Meiryo UI" panose="020B0604030504040204" pitchFamily="34" charset="-128"/>
+              <a:ea typeface="Meiryo UI" panose="020B0604030504040204" pitchFamily="34" charset="-128"/>
+            </a:endParaRPr>
+          </a:p>
+        </p:txBody>
+      </p:sp>
+      <p:sp>
+        <p:nvSpPr>
+          <p:cNvPr id="2" name="タイトル 1">
+            <a:extLst>
+              <a:ext uri="{FF2B5EF4-FFF2-40B4-BE49-F238E27FC236}">
+                <a16:creationId xmlns:a16="http://schemas.microsoft.com/office/drawing/2014/main" id="{02109332-3ED3-242C-2B0E-8FB88D4B9B9F}"/>
+              </a:ext>
+            </a:extLst>
+          </p:cNvPr>
+          <p:cNvSpPr>
+            <a:spLocks noGrp="1"/>
+          </p:cNvSpPr>
+          <p:nvPr>
+            <p:ph type="title"/>
+          </p:nvPr>
+        </p:nvSpPr>
+        <p:spPr>
+          <a:xfrm>
+            <a:off x="609600" y="116632"/>
+            <a:ext cx="10972800" cy="746548"/>
+          </a:xfrm>
+        </p:spPr>
+        <p:txBody>
+          <a:bodyPr/>
+          <a:lstStyle/>
+          <a:p>
+            <a:r>
+              <a:rPr kumimoji="1" lang="ja-JP" altLang="en-US"/>
+              <a:t>シミュレーション結果</a:t>
+            </a:r>
+            <a:r>
+              <a:rPr kumimoji="1" lang="en-US" altLang="ja-JP"/>
+              <a:t>(</a:t>
+            </a:r>
+            <a:r>
+              <a:rPr kumimoji="1" lang="ja-JP" altLang="en-US"/>
+              <a:t>詳しく</a:t>
+            </a:r>
+            <a:r>
+              <a:rPr kumimoji="1" lang="en-US" altLang="ja-JP"/>
+              <a:t>)</a:t>
+            </a:r>
+            <a:endParaRPr kumimoji="1" lang="ja-JP" altLang="en-US"/>
+          </a:p>
+        </p:txBody>
+      </p:sp>
+      <p:sp>
+        <p:nvSpPr>
+          <p:cNvPr id="10" name="テキスト ボックス 9">
+            <a:extLst>
+              <a:ext uri="{FF2B5EF4-FFF2-40B4-BE49-F238E27FC236}">
+                <a16:creationId xmlns:a16="http://schemas.microsoft.com/office/drawing/2014/main" id="{579DDCB6-464E-481E-0A02-611387EAF6C2}"/>
+              </a:ext>
+            </a:extLst>
+          </p:cNvPr>
+          <p:cNvSpPr txBox="1"/>
+          <p:nvPr/>
+        </p:nvSpPr>
+        <p:spPr>
+          <a:xfrm>
+            <a:off x="2942799" y="2420888"/>
+            <a:ext cx="1208985" cy="738664"/>
+          </a:xfrm>
+          <a:prstGeom prst="rect">
+            <a:avLst/>
+          </a:prstGeom>
+          <a:solidFill>
+            <a:schemeClr val="bg1"/>
+          </a:solidFill>
+          <a:ln>
+            <a:solidFill>
+              <a:schemeClr val="bg1">
+                <a:lumMod val="65000"/>
+              </a:schemeClr>
+            </a:solidFill>
+          </a:ln>
+        </p:spPr>
+        <p:txBody>
+          <a:bodyPr wrap="none" rtlCol="0">
+            <a:spAutoFit/>
+          </a:bodyPr>
+          <a:lstStyle/>
+          <a:p>
+            <a:r>
               <a:rPr kumimoji="1" lang="en-US" altLang="ja-JP" sz="1400"/>
               <a:t>10 Assets</a:t>
             </a:r>
@@ -13180,7 +13530,7 @@
                 <a:latin typeface="Times New Roman" panose="02020603050405020304" pitchFamily="18" charset="0"/>
                 <a:cs typeface="Times New Roman" panose="02020603050405020304" pitchFamily="18" charset="0"/>
               </a:rPr>
-              <a:t>Δt     = 10 ms</a:t>
+              <a:t>ΔT     = 10 ms</a:t>
             </a:r>
             <a:endParaRPr kumimoji="1" lang="ja-JP" altLang="en-US" sz="1400">
               <a:latin typeface="Times New Roman" panose="02020603050405020304" pitchFamily="18" charset="0"/>
@@ -25917,7 +26267,7 @@
               </a:rPr>
               <a:t>アセット時間が進んでいる</a:t>
             </a:r>
-            <a:endParaRPr kumimoji="1" lang="en-US" altLang="ja-JP" sz="1600">
+            <a:endParaRPr kumimoji="1" lang="en-US" altLang="ja-JP" sz="1600" dirty="0">
               <a:solidFill>
                 <a:srgbClr val="FF0000"/>
               </a:solidFill>
@@ -25928,7 +26278,7 @@
           <a:p>
             <a:pPr algn="ctr"/>
             <a:r>
-              <a:rPr kumimoji="1" lang="en-US" altLang="ja-JP" sz="1600">
+              <a:rPr kumimoji="1" lang="en-US" altLang="ja-JP" sz="1600" dirty="0">
                 <a:solidFill>
                   <a:srgbClr val="FF0000"/>
                 </a:solidFill>
@@ -25947,7 +26297,7 @@
               </a:rPr>
               <a:t>この状態には</a:t>
             </a:r>
-            <a:endParaRPr kumimoji="1" lang="en-US" altLang="ja-JP" sz="1600">
+            <a:endParaRPr kumimoji="1" lang="en-US" altLang="ja-JP" sz="1600" dirty="0">
               <a:solidFill>
                 <a:srgbClr val="FF0000"/>
               </a:solidFill>
@@ -26401,7 +26751,7 @@
               </a:rPr>
               <a:t>箱庭時刻が許容を</a:t>
             </a:r>
-            <a:endParaRPr kumimoji="1" lang="en-US" altLang="ja-JP" sz="1600">
+            <a:endParaRPr kumimoji="1" lang="en-US" altLang="ja-JP" sz="1600" dirty="0">
               <a:solidFill>
                 <a:srgbClr val="FF0000"/>
               </a:solidFill>
@@ -26421,7 +26771,7 @@
               </a:rPr>
               <a:t>超えて進んでいる</a:t>
             </a:r>
-            <a:endParaRPr kumimoji="1" lang="en-US" altLang="ja-JP" sz="1600">
+            <a:endParaRPr kumimoji="1" lang="en-US" altLang="ja-JP" sz="1600" dirty="0">
               <a:solidFill>
                 <a:srgbClr val="FF0000"/>
               </a:solidFill>
@@ -26432,7 +26782,7 @@
           <a:p>
             <a:pPr algn="ctr"/>
             <a:r>
-              <a:rPr kumimoji="1" lang="en-US" altLang="ja-JP" sz="1600">
+              <a:rPr kumimoji="1" lang="en-US" altLang="ja-JP" sz="1600" dirty="0">
                 <a:solidFill>
                   <a:srgbClr val="FF0000"/>
                 </a:solidFill>
@@ -26451,7 +26801,7 @@
               </a:rPr>
               <a:t>この状態には</a:t>
             </a:r>
-            <a:endParaRPr kumimoji="1" lang="en-US" altLang="ja-JP" sz="1600">
+            <a:endParaRPr kumimoji="1" lang="en-US" altLang="ja-JP" sz="1600" dirty="0">
               <a:solidFill>
                 <a:srgbClr val="FF0000"/>
               </a:solidFill>

</xml_diff>

<commit_message>
added cute icons to the concept(from the paper)
</commit_message>
<xml_diff>
--- a/math/Hakoniwa-time.pptx
+++ b/math/Hakoniwa-time.pptx
@@ -304,7 +304,7 @@
               <a:pPr>
                 <a:defRPr/>
               </a:pPr>
-              <a:t>2024/9/26</a:t>
+              <a:t>2024/10/16</a:t>
             </a:fld>
             <a:endParaRPr lang="ja-JP" altLang="en-US" dirty="0"/>
           </a:p>
@@ -989,7 +989,7 @@
           <a:p>
             <a:fld id="{1733E518-4B2E-46CC-A779-D7A67A1295D7}" type="datetimeFigureOut">
               <a:rPr kumimoji="1" lang="ja-JP" altLang="en-US" smtClean="0"/>
-              <a:t>2024/9/26</a:t>
+              <a:t>2024/10/16</a:t>
             </a:fld>
             <a:endParaRPr kumimoji="1" lang="ja-JP" altLang="en-US"/>
           </a:p>
@@ -1189,7 +1189,7 @@
           <a:p>
             <a:fld id="{1733E518-4B2E-46CC-A779-D7A67A1295D7}" type="datetimeFigureOut">
               <a:rPr kumimoji="1" lang="ja-JP" altLang="en-US" smtClean="0"/>
-              <a:t>2024/9/26</a:t>
+              <a:t>2024/10/16</a:t>
             </a:fld>
             <a:endParaRPr kumimoji="1" lang="ja-JP" altLang="en-US"/>
           </a:p>
@@ -1399,7 +1399,7 @@
           <a:p>
             <a:fld id="{1733E518-4B2E-46CC-A779-D7A67A1295D7}" type="datetimeFigureOut">
               <a:rPr kumimoji="1" lang="ja-JP" altLang="en-US" smtClean="0"/>
-              <a:t>2024/9/26</a:t>
+              <a:t>2024/10/16</a:t>
             </a:fld>
             <a:endParaRPr kumimoji="1" lang="ja-JP" altLang="en-US"/>
           </a:p>
@@ -3803,7 +3803,7 @@
           <a:p>
             <a:fld id="{1733E518-4B2E-46CC-A779-D7A67A1295D7}" type="datetimeFigureOut">
               <a:rPr kumimoji="1" lang="ja-JP" altLang="en-US" smtClean="0"/>
-              <a:t>2024/9/26</a:t>
+              <a:t>2024/10/16</a:t>
             </a:fld>
             <a:endParaRPr kumimoji="1" lang="ja-JP" altLang="en-US"/>
           </a:p>
@@ -5290,7 +5290,7 @@
           <a:p>
             <a:fld id="{1733E518-4B2E-46CC-A779-D7A67A1295D7}" type="datetimeFigureOut">
               <a:rPr kumimoji="1" lang="ja-JP" altLang="en-US" smtClean="0"/>
-              <a:t>2024/9/26</a:t>
+              <a:t>2024/10/16</a:t>
             </a:fld>
             <a:endParaRPr kumimoji="1" lang="ja-JP" altLang="en-US"/>
           </a:p>
@@ -5639,7 +5639,7 @@
           <a:p>
             <a:fld id="{1733E518-4B2E-46CC-A779-D7A67A1295D7}" type="datetimeFigureOut">
               <a:rPr kumimoji="1" lang="ja-JP" altLang="en-US" smtClean="0"/>
-              <a:t>2024/9/26</a:t>
+              <a:t>2024/10/16</a:t>
             </a:fld>
             <a:endParaRPr kumimoji="1" lang="ja-JP" altLang="en-US"/>
           </a:p>
@@ -6122,7 +6122,7 @@
           <a:p>
             <a:fld id="{1733E518-4B2E-46CC-A779-D7A67A1295D7}" type="datetimeFigureOut">
               <a:rPr kumimoji="1" lang="ja-JP" altLang="en-US" smtClean="0"/>
-              <a:t>2024/9/26</a:t>
+              <a:t>2024/10/16</a:t>
             </a:fld>
             <a:endParaRPr kumimoji="1" lang="ja-JP" altLang="en-US"/>
           </a:p>
@@ -6239,7 +6239,7 @@
           <a:p>
             <a:fld id="{1733E518-4B2E-46CC-A779-D7A67A1295D7}" type="datetimeFigureOut">
               <a:rPr kumimoji="1" lang="ja-JP" altLang="en-US" smtClean="0"/>
-              <a:t>2024/9/26</a:t>
+              <a:t>2024/10/16</a:t>
             </a:fld>
             <a:endParaRPr kumimoji="1" lang="ja-JP" altLang="en-US"/>
           </a:p>
@@ -6334,7 +6334,7 @@
           <a:p>
             <a:fld id="{1733E518-4B2E-46CC-A779-D7A67A1295D7}" type="datetimeFigureOut">
               <a:rPr kumimoji="1" lang="ja-JP" altLang="en-US" smtClean="0"/>
-              <a:t>2024/9/26</a:t>
+              <a:t>2024/10/16</a:t>
             </a:fld>
             <a:endParaRPr kumimoji="1" lang="ja-JP" altLang="en-US"/>
           </a:p>
@@ -6641,7 +6641,7 @@
           <a:p>
             <a:fld id="{1733E518-4B2E-46CC-A779-D7A67A1295D7}" type="datetimeFigureOut">
               <a:rPr kumimoji="1" lang="ja-JP" altLang="en-US" smtClean="0"/>
-              <a:t>2024/9/26</a:t>
+              <a:t>2024/10/16</a:t>
             </a:fld>
             <a:endParaRPr kumimoji="1" lang="ja-JP" altLang="en-US"/>
           </a:p>
@@ -6893,7 +6893,7 @@
           <a:p>
             <a:fld id="{1733E518-4B2E-46CC-A779-D7A67A1295D7}" type="datetimeFigureOut">
               <a:rPr kumimoji="1" lang="ja-JP" altLang="en-US" smtClean="0"/>
-              <a:t>2024/9/26</a:t>
+              <a:t>2024/10/16</a:t>
             </a:fld>
             <a:endParaRPr kumimoji="1" lang="ja-JP" altLang="en-US"/>
           </a:p>
@@ -7136,7 +7136,7 @@
           <a:p>
             <a:fld id="{1733E518-4B2E-46CC-A779-D7A67A1295D7}" type="datetimeFigureOut">
               <a:rPr kumimoji="1" lang="ja-JP" altLang="en-US" smtClean="0"/>
-              <a:t>2024/9/26</a:t>
+              <a:t>2024/10/16</a:t>
             </a:fld>
             <a:endParaRPr kumimoji="1" lang="ja-JP" altLang="en-US"/>
           </a:p>
@@ -14994,7 +14994,7 @@
         </p:nvSpPr>
         <p:spPr>
           <a:xfrm>
-            <a:off x="2641155" y="3501646"/>
+            <a:off x="2641155" y="3880275"/>
             <a:ext cx="855095" cy="855095"/>
           </a:xfrm>
           <a:custGeom>
@@ -15139,7 +15139,7 @@
         </p:nvSpPr>
         <p:spPr>
           <a:xfrm>
-            <a:off x="3046200" y="3704169"/>
+            <a:off x="3046200" y="4082798"/>
             <a:ext cx="196896" cy="399419"/>
           </a:xfrm>
           <a:custGeom>
@@ -15253,7 +15253,7 @@
         </p:nvSpPr>
         <p:spPr>
           <a:xfrm>
-            <a:off x="3046200" y="3614159"/>
+            <a:off x="3046200" y="3992788"/>
             <a:ext cx="45005" cy="45005"/>
           </a:xfrm>
           <a:custGeom>
@@ -15349,7 +15349,7 @@
         </p:nvSpPr>
         <p:spPr>
           <a:xfrm>
-            <a:off x="3046200" y="4199224"/>
+            <a:off x="3046200" y="4577853"/>
             <a:ext cx="45005" cy="45005"/>
           </a:xfrm>
           <a:custGeom>
@@ -15445,7 +15445,7 @@
         </p:nvSpPr>
         <p:spPr>
           <a:xfrm>
-            <a:off x="2753668" y="3906691"/>
+            <a:off x="2753668" y="4285320"/>
             <a:ext cx="45005" cy="45005"/>
           </a:xfrm>
           <a:custGeom>
@@ -15541,7 +15541,7 @@
         </p:nvSpPr>
         <p:spPr>
           <a:xfrm>
-            <a:off x="3338733" y="3906691"/>
+            <a:off x="3338733" y="4285320"/>
             <a:ext cx="45005" cy="45005"/>
           </a:xfrm>
           <a:custGeom>
@@ -15804,7 +15804,7 @@
         </p:nvSpPr>
         <p:spPr>
           <a:xfrm>
-            <a:off x="1984509" y="4634556"/>
+            <a:off x="1984509" y="5013185"/>
             <a:ext cx="2160240" cy="648063"/>
           </a:xfrm>
           <a:prstGeom prst="rect">
@@ -15900,7 +15900,7 @@
         </p:nvSpPr>
         <p:spPr>
           <a:xfrm>
-            <a:off x="4983200" y="4634556"/>
+            <a:off x="4983200" y="5013185"/>
             <a:ext cx="2160240" cy="648060"/>
           </a:xfrm>
           <a:prstGeom prst="rect">
@@ -15992,7 +15992,7 @@
         </p:nvCxnSpPr>
         <p:spPr>
           <a:xfrm flipH="1">
-            <a:off x="3064629" y="4469254"/>
+            <a:off x="3064629" y="4847883"/>
             <a:ext cx="4074" cy="165302"/>
           </a:xfrm>
           <a:prstGeom prst="line">
@@ -16031,7 +16031,7 @@
         </p:nvCxnSpPr>
         <p:spPr>
           <a:xfrm>
-            <a:off x="6054838" y="4469255"/>
+            <a:off x="6054838" y="4847884"/>
             <a:ext cx="8482" cy="165301"/>
           </a:xfrm>
           <a:prstGeom prst="line">
@@ -16067,7 +16067,7 @@
         </p:nvSpPr>
         <p:spPr>
           <a:xfrm>
-            <a:off x="7961173" y="4634556"/>
+            <a:off x="7961173" y="5013185"/>
             <a:ext cx="2160240" cy="648055"/>
           </a:xfrm>
           <a:prstGeom prst="rect">
@@ -16159,7 +16159,7 @@
         </p:nvCxnSpPr>
         <p:spPr>
           <a:xfrm>
-            <a:off x="9038333" y="4469255"/>
+            <a:off x="9038333" y="4847884"/>
             <a:ext cx="2960" cy="165301"/>
           </a:xfrm>
           <a:prstGeom prst="line">
@@ -16195,7 +16195,7 @@
         </p:nvCxnSpPr>
         <p:spPr>
           <a:xfrm>
-            <a:off x="1991544" y="2783631"/>
+            <a:off x="1991544" y="3162260"/>
             <a:ext cx="7920880" cy="0"/>
           </a:xfrm>
           <a:prstGeom prst="line">
@@ -16231,7 +16231,7 @@
         </p:nvSpPr>
         <p:spPr>
           <a:xfrm>
-            <a:off x="2926168" y="2694893"/>
+            <a:off x="2926168" y="3073522"/>
             <a:ext cx="285071" cy="162898"/>
           </a:xfrm>
           <a:prstGeom prst="rect">
@@ -16291,9 +16291,9 @@
           <p:nvPr/>
         </p:nvCxnSpPr>
         <p:spPr>
-          <a:xfrm flipH="1">
-            <a:off x="3064628" y="2857791"/>
-            <a:ext cx="4076" cy="327303"/>
+          <a:xfrm>
+            <a:off x="3068704" y="3236420"/>
+            <a:ext cx="5148" cy="327303"/>
           </a:xfrm>
           <a:prstGeom prst="line">
             <a:avLst/>
@@ -16331,7 +16331,7 @@
         </p:nvSpPr>
         <p:spPr>
           <a:xfrm>
-            <a:off x="5905277" y="2705810"/>
+            <a:off x="5905277" y="3084439"/>
             <a:ext cx="285071" cy="162898"/>
           </a:xfrm>
           <a:prstGeom prst="rect">
@@ -16392,7 +16392,7 @@
         </p:nvCxnSpPr>
         <p:spPr>
           <a:xfrm flipH="1">
-            <a:off x="6047812" y="2868708"/>
+            <a:off x="6047812" y="3247337"/>
             <a:ext cx="1" cy="362891"/>
           </a:xfrm>
           <a:prstGeom prst="line">
@@ -16431,7 +16431,7 @@
         </p:nvSpPr>
         <p:spPr>
           <a:xfrm>
-            <a:off x="8891767" y="2732823"/>
+            <a:off x="8891767" y="3111452"/>
             <a:ext cx="285071" cy="162898"/>
           </a:xfrm>
           <a:prstGeom prst="rect">
@@ -16492,7 +16492,7 @@
         </p:nvCxnSpPr>
         <p:spPr>
           <a:xfrm>
-            <a:off x="9034303" y="2895721"/>
+            <a:off x="9034303" y="3274350"/>
             <a:ext cx="6990" cy="293816"/>
           </a:xfrm>
           <a:prstGeom prst="line">
@@ -16531,8 +16531,8 @@
         </p:nvSpPr>
         <p:spPr>
           <a:xfrm>
-            <a:off x="2211942" y="3185094"/>
-            <a:ext cx="1705371" cy="276999"/>
+            <a:off x="1995919" y="3563723"/>
+            <a:ext cx="2155865" cy="276999"/>
           </a:xfrm>
           <a:prstGeom prst="rect">
             <a:avLst/>
@@ -16551,18 +16551,28 @@
                 <a:latin typeface="Meiryo UI" panose="020B0604030504040204" pitchFamily="34" charset="-128"/>
                 <a:ea typeface="Meiryo UI" panose="020B0604030504040204" pitchFamily="34" charset="-128"/>
               </a:rPr>
-              <a:t>Simulation Time T</a:t>
-            </a:r>
-            <a:r>
-              <a:rPr lang="en-US" altLang="ja-JP" sz="1200" baseline="-25000" dirty="0">
-                <a:latin typeface="Meiryo UI" panose="020B0604030504040204" pitchFamily="34" charset="-128"/>
+              <a:t>Assert Time </a:t>
+            </a:r>
+            <a:r>
+              <a:rPr lang="en-US" altLang="ja-JP" sz="1200" i="1" dirty="0">
+                <a:latin typeface="Times New Roman" panose="02020603050405020304" pitchFamily="18" charset="0"/>
                 <a:ea typeface="Meiryo UI" panose="020B0604030504040204" pitchFamily="34" charset="-128"/>
+                <a:cs typeface="Times New Roman" panose="02020603050405020304" pitchFamily="18" charset="0"/>
+              </a:rPr>
+              <a:t>T</a:t>
+            </a:r>
+            <a:r>
+              <a:rPr lang="en-US" altLang="ja-JP" sz="1200" i="1" baseline="-25000" dirty="0">
+                <a:latin typeface="Times New Roman" panose="02020603050405020304" pitchFamily="18" charset="0"/>
+                <a:ea typeface="Meiryo UI" panose="020B0604030504040204" pitchFamily="34" charset="-128"/>
+                <a:cs typeface="Times New Roman" panose="02020603050405020304" pitchFamily="18" charset="0"/>
               </a:rPr>
               <a:t>1</a:t>
             </a:r>
-            <a:endParaRPr lang="ja-JP" altLang="en-US" sz="1200" baseline="-25000" dirty="0">
-              <a:latin typeface="Meiryo UI" panose="020B0604030504040204" pitchFamily="34" charset="-128"/>
+            <a:endParaRPr lang="ja-JP" altLang="en-US" sz="1200" i="1" baseline="-25000" dirty="0">
+              <a:latin typeface="Times New Roman" panose="02020603050405020304" pitchFamily="18" charset="0"/>
               <a:ea typeface="Meiryo UI" panose="020B0604030504040204" pitchFamily="34" charset="-128"/>
+              <a:cs typeface="Times New Roman" panose="02020603050405020304" pitchFamily="18" charset="0"/>
             </a:endParaRPr>
           </a:p>
         </p:txBody>
@@ -16581,7 +16591,7 @@
         </p:nvSpPr>
         <p:spPr>
           <a:xfrm>
-            <a:off x="5626324" y="3539475"/>
+            <a:off x="5626324" y="3918104"/>
             <a:ext cx="855095" cy="855095"/>
           </a:xfrm>
           <a:custGeom>
@@ -16726,7 +16736,7 @@
         </p:nvSpPr>
         <p:spPr>
           <a:xfrm>
-            <a:off x="6031369" y="3741998"/>
+            <a:off x="6031369" y="4120627"/>
             <a:ext cx="196896" cy="399419"/>
           </a:xfrm>
           <a:custGeom>
@@ -16840,7 +16850,7 @@
         </p:nvSpPr>
         <p:spPr>
           <a:xfrm>
-            <a:off x="6031369" y="3651988"/>
+            <a:off x="6031369" y="4030617"/>
             <a:ext cx="45005" cy="45005"/>
           </a:xfrm>
           <a:custGeom>
@@ -16936,7 +16946,7 @@
         </p:nvSpPr>
         <p:spPr>
           <a:xfrm>
-            <a:off x="6031369" y="4237053"/>
+            <a:off x="6031369" y="4615682"/>
             <a:ext cx="45005" cy="45005"/>
           </a:xfrm>
           <a:custGeom>
@@ -17032,7 +17042,7 @@
         </p:nvSpPr>
         <p:spPr>
           <a:xfrm>
-            <a:off x="5738837" y="3944520"/>
+            <a:off x="5738837" y="4323149"/>
             <a:ext cx="45005" cy="45005"/>
           </a:xfrm>
           <a:custGeom>
@@ -17128,7 +17138,7 @@
         </p:nvSpPr>
         <p:spPr>
           <a:xfrm>
-            <a:off x="6323902" y="3944520"/>
+            <a:off x="6323902" y="4323149"/>
             <a:ext cx="45005" cy="45005"/>
           </a:xfrm>
           <a:custGeom>
@@ -17224,7 +17234,7 @@
         </p:nvSpPr>
         <p:spPr>
           <a:xfrm>
-            <a:off x="5109858" y="3231599"/>
+            <a:off x="5109858" y="3610228"/>
             <a:ext cx="1875907" cy="276999"/>
           </a:xfrm>
           <a:prstGeom prst="rect">
@@ -17244,18 +17254,28 @@
                 <a:latin typeface="Meiryo UI" panose="020B0604030504040204" pitchFamily="34" charset="-128"/>
                 <a:ea typeface="Meiryo UI" panose="020B0604030504040204" pitchFamily="34" charset="-128"/>
               </a:rPr>
-              <a:t>Simulation Time T</a:t>
-            </a:r>
-            <a:r>
-              <a:rPr lang="en-US" altLang="ja-JP" sz="1200" baseline="-25000" dirty="0">
-                <a:latin typeface="Meiryo UI" panose="020B0604030504040204" pitchFamily="34" charset="-128"/>
+              <a:t>Asset Time </a:t>
+            </a:r>
+            <a:r>
+              <a:rPr lang="en-US" altLang="ja-JP" sz="1200" i="1" dirty="0">
+                <a:latin typeface="Times New Roman" panose="02020603050405020304" pitchFamily="18" charset="0"/>
                 <a:ea typeface="Meiryo UI" panose="020B0604030504040204" pitchFamily="34" charset="-128"/>
+                <a:cs typeface="Times New Roman" panose="02020603050405020304" pitchFamily="18" charset="0"/>
+              </a:rPr>
+              <a:t>T</a:t>
+            </a:r>
+            <a:r>
+              <a:rPr lang="en-US" altLang="ja-JP" sz="1200" i="1" baseline="-25000" dirty="0">
+                <a:latin typeface="Times New Roman" panose="02020603050405020304" pitchFamily="18" charset="0"/>
+                <a:ea typeface="Meiryo UI" panose="020B0604030504040204" pitchFamily="34" charset="-128"/>
+                <a:cs typeface="Times New Roman" panose="02020603050405020304" pitchFamily="18" charset="0"/>
               </a:rPr>
               <a:t>2</a:t>
             </a:r>
-            <a:endParaRPr lang="ja-JP" altLang="en-US" sz="1200" baseline="-25000" dirty="0">
-              <a:latin typeface="Meiryo UI" panose="020B0604030504040204" pitchFamily="34" charset="-128"/>
+            <a:endParaRPr lang="ja-JP" altLang="en-US" sz="1200" i="1" baseline="-25000" dirty="0">
+              <a:latin typeface="Times New Roman" panose="02020603050405020304" pitchFamily="18" charset="0"/>
               <a:ea typeface="Meiryo UI" panose="020B0604030504040204" pitchFamily="34" charset="-128"/>
+              <a:cs typeface="Times New Roman" panose="02020603050405020304" pitchFamily="18" charset="0"/>
             </a:endParaRPr>
           </a:p>
         </p:txBody>
@@ -17274,7 +17294,7 @@
         </p:nvSpPr>
         <p:spPr>
           <a:xfrm>
-            <a:off x="8605078" y="3500295"/>
+            <a:off x="8605078" y="3878924"/>
             <a:ext cx="855095" cy="855095"/>
           </a:xfrm>
           <a:custGeom>
@@ -17419,7 +17439,7 @@
         </p:nvSpPr>
         <p:spPr>
           <a:xfrm>
-            <a:off x="9010123" y="3702818"/>
+            <a:off x="9010123" y="4081447"/>
             <a:ext cx="196896" cy="399419"/>
           </a:xfrm>
           <a:custGeom>
@@ -17533,7 +17553,7 @@
         </p:nvSpPr>
         <p:spPr>
           <a:xfrm>
-            <a:off x="9010123" y="3612808"/>
+            <a:off x="9010123" y="3991437"/>
             <a:ext cx="45005" cy="45005"/>
           </a:xfrm>
           <a:custGeom>
@@ -17629,7 +17649,7 @@
         </p:nvSpPr>
         <p:spPr>
           <a:xfrm>
-            <a:off x="9010123" y="4197873"/>
+            <a:off x="9010123" y="4576502"/>
             <a:ext cx="45005" cy="45005"/>
           </a:xfrm>
           <a:custGeom>
@@ -17725,7 +17745,7 @@
         </p:nvSpPr>
         <p:spPr>
           <a:xfrm>
-            <a:off x="8717591" y="3905340"/>
+            <a:off x="8717591" y="4283969"/>
             <a:ext cx="45005" cy="45005"/>
           </a:xfrm>
           <a:custGeom>
@@ -17821,7 +17841,7 @@
         </p:nvSpPr>
         <p:spPr>
           <a:xfrm>
-            <a:off x="9302656" y="3905340"/>
+            <a:off x="9302656" y="4283969"/>
             <a:ext cx="45005" cy="45005"/>
           </a:xfrm>
           <a:custGeom>
@@ -17917,7 +17937,7 @@
         </p:nvSpPr>
         <p:spPr>
           <a:xfrm>
-            <a:off x="8224287" y="3189537"/>
+            <a:off x="8224287" y="3568166"/>
             <a:ext cx="1634011" cy="276999"/>
           </a:xfrm>
           <a:prstGeom prst="rect">
@@ -17937,18 +17957,28 @@
                 <a:latin typeface="Meiryo UI" panose="020B0604030504040204" pitchFamily="34" charset="-128"/>
                 <a:ea typeface="Meiryo UI" panose="020B0604030504040204" pitchFamily="34" charset="-128"/>
               </a:rPr>
-              <a:t>Simulation Time T</a:t>
-            </a:r>
-            <a:r>
-              <a:rPr lang="en-US" altLang="ja-JP" sz="1200" baseline="-25000" dirty="0">
-                <a:latin typeface="Meiryo UI" panose="020B0604030504040204" pitchFamily="34" charset="-128"/>
+              <a:t>Asset Time </a:t>
+            </a:r>
+            <a:r>
+              <a:rPr lang="en-US" altLang="ja-JP" sz="1200" i="1" dirty="0">
+                <a:latin typeface="Times New Roman" panose="02020603050405020304" pitchFamily="18" charset="0"/>
                 <a:ea typeface="Meiryo UI" panose="020B0604030504040204" pitchFamily="34" charset="-128"/>
+                <a:cs typeface="Times New Roman" panose="02020603050405020304" pitchFamily="18" charset="0"/>
+              </a:rPr>
+              <a:t>T</a:t>
+            </a:r>
+            <a:r>
+              <a:rPr lang="en-US" altLang="ja-JP" sz="1200" i="1" baseline="-25000" dirty="0">
+                <a:latin typeface="Times New Roman" panose="02020603050405020304" pitchFamily="18" charset="0"/>
+                <a:ea typeface="Meiryo UI" panose="020B0604030504040204" pitchFamily="34" charset="-128"/>
+                <a:cs typeface="Times New Roman" panose="02020603050405020304" pitchFamily="18" charset="0"/>
               </a:rPr>
               <a:t>3</a:t>
             </a:r>
-            <a:endParaRPr lang="ja-JP" altLang="en-US" sz="1200" baseline="-25000" dirty="0">
-              <a:latin typeface="Meiryo UI" panose="020B0604030504040204" pitchFamily="34" charset="-128"/>
+            <a:endParaRPr lang="ja-JP" altLang="en-US" sz="1200" i="1" baseline="-25000" dirty="0">
+              <a:latin typeface="Times New Roman" panose="02020603050405020304" pitchFamily="18" charset="0"/>
               <a:ea typeface="Meiryo UI" panose="020B0604030504040204" pitchFamily="34" charset="-128"/>
+              <a:cs typeface="Times New Roman" panose="02020603050405020304" pitchFamily="18" charset="0"/>
             </a:endParaRPr>
           </a:p>
         </p:txBody>
@@ -17967,7 +17997,7 @@
         </p:nvSpPr>
         <p:spPr>
           <a:xfrm rot="16200000">
-            <a:off x="5891941" y="-760380"/>
+            <a:off x="5891941" y="-381751"/>
             <a:ext cx="321998" cy="6538615"/>
           </a:xfrm>
           <a:prstGeom prst="rightBrace">
@@ -18014,7 +18044,7 @@
         </p:nvSpPr>
         <p:spPr>
           <a:xfrm>
-            <a:off x="4367808" y="1340768"/>
+            <a:off x="4367808" y="1719397"/>
             <a:ext cx="3240360" cy="971278"/>
           </a:xfrm>
           <a:prstGeom prst="flowChartAlternateProcess">
@@ -18156,6 +18186,268 @@
           </a:p>
         </p:txBody>
       </p:sp>
+      <p:pic>
+        <p:nvPicPr>
+          <p:cNvPr id="7" name="グラフィックス 6" descr="指揮者">
+            <a:extLst>
+              <a:ext uri="{FF2B5EF4-FFF2-40B4-BE49-F238E27FC236}">
+                <a16:creationId xmlns:a16="http://schemas.microsoft.com/office/drawing/2014/main" id="{7248C219-46F6-574E-D5B9-83D71E8B6101}"/>
+              </a:ext>
+            </a:extLst>
+          </p:cNvPr>
+          <p:cNvPicPr>
+            <a:picLocks noChangeAspect="1"/>
+          </p:cNvPicPr>
+          <p:nvPr/>
+        </p:nvPicPr>
+        <p:blipFill>
+          <a:blip r:embed="rId2">
+            <a:extLst>
+              <a:ext uri="{28A0092B-C50C-407E-A947-70E740481C1C}">
+                <a14:useLocalDpi xmlns:a14="http://schemas.microsoft.com/office/drawing/2010/main" val="0"/>
+              </a:ext>
+              <a:ext uri="{96DAC541-7B7A-43D3-8B79-37D633B846F1}">
+                <asvg:svgBlip xmlns:asvg="http://schemas.microsoft.com/office/drawing/2016/SVG/main" r:embed="rId3"/>
+              </a:ext>
+            </a:extLst>
+          </a:blip>
+          <a:stretch>
+            <a:fillRect/>
+          </a:stretch>
+        </p:blipFill>
+        <p:spPr>
+          <a:xfrm>
+            <a:off x="7690678" y="1298105"/>
+            <a:ext cx="914400" cy="914400"/>
+          </a:xfrm>
+          <a:prstGeom prst="rect">
+            <a:avLst/>
+          </a:prstGeom>
+        </p:spPr>
+      </p:pic>
+      <p:pic>
+        <p:nvPicPr>
+          <p:cNvPr id="8" name="グラフィックス 7" descr="バイオリン">
+            <a:extLst>
+              <a:ext uri="{FF2B5EF4-FFF2-40B4-BE49-F238E27FC236}">
+                <a16:creationId xmlns:a16="http://schemas.microsoft.com/office/drawing/2014/main" id="{0EFEA0BC-22FB-7ED1-38D8-EA7B97EEFE14}"/>
+              </a:ext>
+            </a:extLst>
+          </p:cNvPr>
+          <p:cNvPicPr>
+            <a:picLocks noChangeAspect="1"/>
+          </p:cNvPicPr>
+          <p:nvPr/>
+        </p:nvPicPr>
+        <p:blipFill>
+          <a:blip r:embed="rId4">
+            <a:extLst>
+              <a:ext uri="{28A0092B-C50C-407E-A947-70E740481C1C}">
+                <a14:useLocalDpi xmlns:a14="http://schemas.microsoft.com/office/drawing/2010/main" val="0"/>
+              </a:ext>
+              <a:ext uri="{96DAC541-7B7A-43D3-8B79-37D633B846F1}">
+                <asvg:svgBlip xmlns:asvg="http://schemas.microsoft.com/office/drawing/2016/SVG/main" r:embed="rId5"/>
+              </a:ext>
+            </a:extLst>
+          </a:blip>
+          <a:stretch>
+            <a:fillRect/>
+          </a:stretch>
+        </p:blipFill>
+        <p:spPr>
+          <a:xfrm>
+            <a:off x="3540109" y="4312304"/>
+            <a:ext cx="557548" cy="557548"/>
+          </a:xfrm>
+          <a:prstGeom prst="rect">
+            <a:avLst/>
+          </a:prstGeom>
+        </p:spPr>
+      </p:pic>
+      <p:pic>
+        <p:nvPicPr>
+          <p:cNvPr id="9" name="グラフィックス 8" descr="ドラム">
+            <a:extLst>
+              <a:ext uri="{FF2B5EF4-FFF2-40B4-BE49-F238E27FC236}">
+                <a16:creationId xmlns:a16="http://schemas.microsoft.com/office/drawing/2014/main" id="{6C90556B-C1F2-8BCE-256C-79F574BC20E5}"/>
+              </a:ext>
+            </a:extLst>
+          </p:cNvPr>
+          <p:cNvPicPr>
+            <a:picLocks noChangeAspect="1"/>
+          </p:cNvPicPr>
+          <p:nvPr/>
+        </p:nvPicPr>
+        <p:blipFill>
+          <a:blip r:embed="rId6">
+            <a:extLst>
+              <a:ext uri="{28A0092B-C50C-407E-A947-70E740481C1C}">
+                <a14:useLocalDpi xmlns:a14="http://schemas.microsoft.com/office/drawing/2010/main" val="0"/>
+              </a:ext>
+              <a:ext uri="{96DAC541-7B7A-43D3-8B79-37D633B846F1}">
+                <asvg:svgBlip xmlns:asvg="http://schemas.microsoft.com/office/drawing/2016/SVG/main" r:embed="rId7"/>
+              </a:ext>
+            </a:extLst>
+          </a:blip>
+          <a:stretch>
+            <a:fillRect/>
+          </a:stretch>
+        </p:blipFill>
+        <p:spPr>
+          <a:xfrm>
+            <a:off x="6593371" y="4381913"/>
+            <a:ext cx="557548" cy="557548"/>
+          </a:xfrm>
+          <a:prstGeom prst="rect">
+            <a:avLst/>
+          </a:prstGeom>
+        </p:spPr>
+      </p:pic>
+      <p:pic>
+        <p:nvPicPr>
+          <p:cNvPr id="10" name="グラフィックス 9" descr="サックス">
+            <a:extLst>
+              <a:ext uri="{FF2B5EF4-FFF2-40B4-BE49-F238E27FC236}">
+                <a16:creationId xmlns:a16="http://schemas.microsoft.com/office/drawing/2014/main" id="{0389894E-96D2-D008-8B38-021CCF0C03C8}"/>
+              </a:ext>
+            </a:extLst>
+          </p:cNvPr>
+          <p:cNvPicPr>
+            <a:picLocks noChangeAspect="1"/>
+          </p:cNvPicPr>
+          <p:nvPr/>
+        </p:nvPicPr>
+        <p:blipFill>
+          <a:blip r:embed="rId8">
+            <a:extLst>
+              <a:ext uri="{28A0092B-C50C-407E-A947-70E740481C1C}">
+                <a14:useLocalDpi xmlns:a14="http://schemas.microsoft.com/office/drawing/2010/main" val="0"/>
+              </a:ext>
+              <a:ext uri="{96DAC541-7B7A-43D3-8B79-37D633B846F1}">
+                <asvg:svgBlip xmlns:asvg="http://schemas.microsoft.com/office/drawing/2016/SVG/main" r:embed="rId9"/>
+              </a:ext>
+            </a:extLst>
+          </a:blip>
+          <a:stretch>
+            <a:fillRect/>
+          </a:stretch>
+        </p:blipFill>
+        <p:spPr>
+          <a:xfrm>
+            <a:off x="9535002" y="4372987"/>
+            <a:ext cx="557548" cy="557548"/>
+          </a:xfrm>
+          <a:prstGeom prst="rect">
+            <a:avLst/>
+          </a:prstGeom>
+        </p:spPr>
+      </p:pic>
+      <p:sp>
+        <p:nvSpPr>
+          <p:cNvPr id="13" name="テキスト ボックス 12">
+            <a:extLst>
+              <a:ext uri="{FF2B5EF4-FFF2-40B4-BE49-F238E27FC236}">
+                <a16:creationId xmlns:a16="http://schemas.microsoft.com/office/drawing/2014/main" id="{3B86178E-1DE8-1422-EBD0-0161D42030CA}"/>
+              </a:ext>
+            </a:extLst>
+          </p:cNvPr>
+          <p:cNvSpPr txBox="1"/>
+          <p:nvPr/>
+        </p:nvSpPr>
+        <p:spPr>
+          <a:xfrm>
+            <a:off x="8293464" y="2495938"/>
+            <a:ext cx="1634011" cy="276999"/>
+          </a:xfrm>
+          <a:prstGeom prst="rect">
+            <a:avLst/>
+          </a:prstGeom>
+          <a:noFill/>
+        </p:spPr>
+        <p:txBody>
+          <a:bodyPr wrap="square" rtlCol="0">
+            <a:spAutoFit/>
+          </a:bodyPr>
+          <a:lstStyle/>
+          <a:p>
+            <a:pPr algn="ctr"/>
+            <a:r>
+              <a:rPr lang="en-US" altLang="ja-JP" sz="1200" dirty="0">
+                <a:latin typeface="Meiryo UI" panose="020B0604030504040204" pitchFamily="34" charset="-128"/>
+                <a:ea typeface="Meiryo UI" panose="020B0604030504040204" pitchFamily="34" charset="-128"/>
+              </a:rPr>
+              <a:t>Core Time </a:t>
+            </a:r>
+            <a:r>
+              <a:rPr lang="en-US" altLang="ja-JP" sz="1200" i="1" dirty="0">
+                <a:latin typeface="Times New Roman" panose="02020603050405020304" pitchFamily="18" charset="0"/>
+                <a:ea typeface="Meiryo UI" panose="020B0604030504040204" pitchFamily="34" charset="-128"/>
+                <a:cs typeface="Times New Roman" panose="02020603050405020304" pitchFamily="18" charset="0"/>
+              </a:rPr>
+              <a:t>T</a:t>
+            </a:r>
+            <a:r>
+              <a:rPr lang="en-US" altLang="ja-JP" sz="1200" i="1" baseline="-25000" dirty="0">
+                <a:latin typeface="Times New Roman" panose="02020603050405020304" pitchFamily="18" charset="0"/>
+                <a:ea typeface="Meiryo UI" panose="020B0604030504040204" pitchFamily="34" charset="-128"/>
+                <a:cs typeface="Times New Roman" panose="02020603050405020304" pitchFamily="18" charset="0"/>
+              </a:rPr>
+              <a:t>c</a:t>
+            </a:r>
+            <a:endParaRPr lang="ja-JP" altLang="en-US" sz="1200" i="1" baseline="-25000" dirty="0">
+              <a:latin typeface="Times New Roman" panose="02020603050405020304" pitchFamily="18" charset="0"/>
+              <a:ea typeface="Meiryo UI" panose="020B0604030504040204" pitchFamily="34" charset="-128"/>
+              <a:cs typeface="Times New Roman" panose="02020603050405020304" pitchFamily="18" charset="0"/>
+            </a:endParaRPr>
+          </a:p>
+        </p:txBody>
+      </p:sp>
+      <p:pic>
+        <p:nvPicPr>
+          <p:cNvPr id="14" name="コンテンツ プレースホルダー 7" descr="時計">
+            <a:extLst>
+              <a:ext uri="{FF2B5EF4-FFF2-40B4-BE49-F238E27FC236}">
+                <a16:creationId xmlns:a16="http://schemas.microsoft.com/office/drawing/2014/main" id="{A722B95C-D116-4683-6303-CDB691980902}"/>
+              </a:ext>
+            </a:extLst>
+          </p:cNvPr>
+          <p:cNvPicPr>
+            <a:picLocks noChangeAspect="1"/>
+          </p:cNvPicPr>
+          <p:nvPr/>
+        </p:nvPicPr>
+        <p:blipFill>
+          <a:blip r:embed="rId10">
+            <a:extLst>
+              <a:ext uri="{28A0092B-C50C-407E-A947-70E740481C1C}">
+                <a14:useLocalDpi xmlns:a14="http://schemas.microsoft.com/office/drawing/2010/main" val="0"/>
+              </a:ext>
+              <a:ext uri="{96DAC541-7B7A-43D3-8B79-37D633B846F1}">
+                <asvg:svgBlip xmlns:asvg="http://schemas.microsoft.com/office/drawing/2016/SVG/main" r:embed="rId11"/>
+              </a:ext>
+            </a:extLst>
+          </a:blip>
+          <a:stretch>
+            <a:fillRect/>
+          </a:stretch>
+        </p:blipFill>
+        <p:spPr bwMode="auto">
+          <a:xfrm>
+            <a:off x="7775270" y="2072652"/>
+            <a:ext cx="745215" cy="745215"/>
+          </a:xfrm>
+          <a:prstGeom prst="rect">
+            <a:avLst/>
+          </a:prstGeom>
+          <a:noFill/>
+          <a:ln w="9525">
+            <a:noFill/>
+            <a:miter lim="800000"/>
+            <a:headEnd/>
+            <a:tailEnd/>
+          </a:ln>
+        </p:spPr>
+      </p:pic>
     </p:spTree>
     <p:extLst>
       <p:ext uri="{BB962C8B-B14F-4D97-AF65-F5344CB8AC3E}">
@@ -21311,7 +21603,7 @@
                 <a:latin typeface="Meiryo UI" panose="020B0604030504040204" pitchFamily="34" charset="-128"/>
                 <a:ea typeface="Meiryo UI" panose="020B0604030504040204" pitchFamily="34" charset="-128"/>
               </a:rPr>
-              <a:t>シミュレーション時間同期のためのピンポンはしない．ミュレータのベスト・エフォートでの並列同期を実施</a:t>
+              <a:t>シミュレーション時間同期のためのピンポンはしない．シミュレータのベスト・エフォートでの並列同期を実施</a:t>
             </a:r>
           </a:p>
         </p:txBody>

</xml_diff>

<commit_message>
T-distribution figure brush up
</commit_message>
<xml_diff>
--- a/math/Hakoniwa-time.pptx
+++ b/math/Hakoniwa-time.pptx
@@ -304,7 +304,7 @@
               <a:pPr>
                 <a:defRPr/>
               </a:pPr>
-              <a:t>2025/1/10</a:t>
+              <a:t>2025/1/11</a:t>
             </a:fld>
             <a:endParaRPr lang="ja-JP" altLang="en-US" dirty="0"/>
           </a:p>
@@ -989,7 +989,7 @@
           <a:p>
             <a:fld id="{1733E518-4B2E-46CC-A779-D7A67A1295D7}" type="datetimeFigureOut">
               <a:rPr kumimoji="1" lang="ja-JP" altLang="en-US" smtClean="0"/>
-              <a:t>2025/1/10</a:t>
+              <a:t>2025/1/11</a:t>
             </a:fld>
             <a:endParaRPr kumimoji="1" lang="ja-JP" altLang="en-US"/>
           </a:p>
@@ -1189,7 +1189,7 @@
           <a:p>
             <a:fld id="{1733E518-4B2E-46CC-A779-D7A67A1295D7}" type="datetimeFigureOut">
               <a:rPr kumimoji="1" lang="ja-JP" altLang="en-US" smtClean="0"/>
-              <a:t>2025/1/10</a:t>
+              <a:t>2025/1/11</a:t>
             </a:fld>
             <a:endParaRPr kumimoji="1" lang="ja-JP" altLang="en-US"/>
           </a:p>
@@ -1399,7 +1399,7 @@
           <a:p>
             <a:fld id="{1733E518-4B2E-46CC-A779-D7A67A1295D7}" type="datetimeFigureOut">
               <a:rPr kumimoji="1" lang="ja-JP" altLang="en-US" smtClean="0"/>
-              <a:t>2025/1/10</a:t>
+              <a:t>2025/1/11</a:t>
             </a:fld>
             <a:endParaRPr kumimoji="1" lang="ja-JP" altLang="en-US"/>
           </a:p>
@@ -3803,7 +3803,7 @@
           <a:p>
             <a:fld id="{1733E518-4B2E-46CC-A779-D7A67A1295D7}" type="datetimeFigureOut">
               <a:rPr kumimoji="1" lang="ja-JP" altLang="en-US" smtClean="0"/>
-              <a:t>2025/1/10</a:t>
+              <a:t>2025/1/11</a:t>
             </a:fld>
             <a:endParaRPr kumimoji="1" lang="ja-JP" altLang="en-US"/>
           </a:p>
@@ -5290,7 +5290,7 @@
           <a:p>
             <a:fld id="{1733E518-4B2E-46CC-A779-D7A67A1295D7}" type="datetimeFigureOut">
               <a:rPr kumimoji="1" lang="ja-JP" altLang="en-US" smtClean="0"/>
-              <a:t>2025/1/10</a:t>
+              <a:t>2025/1/11</a:t>
             </a:fld>
             <a:endParaRPr kumimoji="1" lang="ja-JP" altLang="en-US"/>
           </a:p>
@@ -5639,7 +5639,7 @@
           <a:p>
             <a:fld id="{1733E518-4B2E-46CC-A779-D7A67A1295D7}" type="datetimeFigureOut">
               <a:rPr kumimoji="1" lang="ja-JP" altLang="en-US" smtClean="0"/>
-              <a:t>2025/1/10</a:t>
+              <a:t>2025/1/11</a:t>
             </a:fld>
             <a:endParaRPr kumimoji="1" lang="ja-JP" altLang="en-US"/>
           </a:p>
@@ -6122,7 +6122,7 @@
           <a:p>
             <a:fld id="{1733E518-4B2E-46CC-A779-D7A67A1295D7}" type="datetimeFigureOut">
               <a:rPr kumimoji="1" lang="ja-JP" altLang="en-US" smtClean="0"/>
-              <a:t>2025/1/10</a:t>
+              <a:t>2025/1/11</a:t>
             </a:fld>
             <a:endParaRPr kumimoji="1" lang="ja-JP" altLang="en-US"/>
           </a:p>
@@ -6239,7 +6239,7 @@
           <a:p>
             <a:fld id="{1733E518-4B2E-46CC-A779-D7A67A1295D7}" type="datetimeFigureOut">
               <a:rPr kumimoji="1" lang="ja-JP" altLang="en-US" smtClean="0"/>
-              <a:t>2025/1/10</a:t>
+              <a:t>2025/1/11</a:t>
             </a:fld>
             <a:endParaRPr kumimoji="1" lang="ja-JP" altLang="en-US"/>
           </a:p>
@@ -6334,7 +6334,7 @@
           <a:p>
             <a:fld id="{1733E518-4B2E-46CC-A779-D7A67A1295D7}" type="datetimeFigureOut">
               <a:rPr kumimoji="1" lang="ja-JP" altLang="en-US" smtClean="0"/>
-              <a:t>2025/1/10</a:t>
+              <a:t>2025/1/11</a:t>
             </a:fld>
             <a:endParaRPr kumimoji="1" lang="ja-JP" altLang="en-US"/>
           </a:p>
@@ -6641,7 +6641,7 @@
           <a:p>
             <a:fld id="{1733E518-4B2E-46CC-A779-D7A67A1295D7}" type="datetimeFigureOut">
               <a:rPr kumimoji="1" lang="ja-JP" altLang="en-US" smtClean="0"/>
-              <a:t>2025/1/10</a:t>
+              <a:t>2025/1/11</a:t>
             </a:fld>
             <a:endParaRPr kumimoji="1" lang="ja-JP" altLang="en-US"/>
           </a:p>
@@ -6893,7 +6893,7 @@
           <a:p>
             <a:fld id="{1733E518-4B2E-46CC-A779-D7A67A1295D7}" type="datetimeFigureOut">
               <a:rPr kumimoji="1" lang="ja-JP" altLang="en-US" smtClean="0"/>
-              <a:t>2025/1/10</a:t>
+              <a:t>2025/1/11</a:t>
             </a:fld>
             <a:endParaRPr kumimoji="1" lang="ja-JP" altLang="en-US"/>
           </a:p>
@@ -7136,7 +7136,7 @@
           <a:p>
             <a:fld id="{1733E518-4B2E-46CC-A779-D7A67A1295D7}" type="datetimeFigureOut">
               <a:rPr kumimoji="1" lang="ja-JP" altLang="en-US" smtClean="0"/>
-              <a:t>2025/1/10</a:t>
+              <a:t>2025/1/11</a:t>
             </a:fld>
             <a:endParaRPr kumimoji="1" lang="ja-JP" altLang="en-US"/>
           </a:p>
@@ -9921,9 +9921,9 @@
         <p:grpSpPr>
           <a:xfrm>
             <a:off x="1271464" y="1390036"/>
-            <a:ext cx="9000995" cy="4870616"/>
+            <a:ext cx="9073009" cy="4870616"/>
             <a:chOff x="3143161" y="2132856"/>
-            <a:chExt cx="6766700" cy="3158466"/>
+            <a:chExt cx="6820838" cy="3158466"/>
           </a:xfrm>
         </p:grpSpPr>
         <p:grpSp>
@@ -9941,11 +9941,66 @@
           <p:grpSpPr>
             <a:xfrm>
               <a:off x="3143161" y="2132856"/>
-              <a:ext cx="6766700" cy="3158466"/>
+              <a:ext cx="6820838" cy="3158466"/>
               <a:chOff x="3143161" y="2204864"/>
-              <a:chExt cx="6766700" cy="3158466"/>
+              <a:chExt cx="6820838" cy="3158466"/>
             </a:xfrm>
           </p:grpSpPr>
+          <p:sp>
+            <p:nvSpPr>
+              <p:cNvPr id="64" name="正方形/長方形 63">
+                <a:extLst>
+                  <a:ext uri="{FF2B5EF4-FFF2-40B4-BE49-F238E27FC236}">
+                    <a16:creationId xmlns:a16="http://schemas.microsoft.com/office/drawing/2014/main" id="{3F8E8A93-3F33-EF25-0A6E-039462A788C0}"/>
+                  </a:ext>
+                </a:extLst>
+              </p:cNvPr>
+              <p:cNvSpPr/>
+              <p:nvPr/>
+            </p:nvSpPr>
+            <p:spPr>
+              <a:xfrm>
+                <a:off x="3924944" y="2335894"/>
+                <a:ext cx="1648967" cy="2318044"/>
+              </a:xfrm>
+              <a:prstGeom prst="rect">
+                <a:avLst/>
+              </a:prstGeom>
+              <a:solidFill>
+                <a:schemeClr val="bg1">
+                  <a:lumMod val="85000"/>
+                </a:schemeClr>
+              </a:solidFill>
+              <a:ln>
+                <a:noFill/>
+                <a:prstDash val="dash"/>
+                <a:headEnd type="none"/>
+                <a:tailEnd type="none"/>
+              </a:ln>
+            </p:spPr>
+            <p:style>
+              <a:lnRef idx="1">
+                <a:schemeClr val="accent1"/>
+              </a:lnRef>
+              <a:fillRef idx="0">
+                <a:schemeClr val="accent1"/>
+              </a:fillRef>
+              <a:effectRef idx="0">
+                <a:schemeClr val="accent1"/>
+              </a:effectRef>
+              <a:fontRef idx="minor">
+                <a:schemeClr val="tx1"/>
+              </a:fontRef>
+            </p:style>
+            <p:txBody>
+              <a:bodyPr rtlCol="0" anchor="ctr"/>
+              <a:lstStyle/>
+              <a:p>
+                <a:pPr algn="ctr"/>
+                <a:endParaRPr kumimoji="1" lang="ja-JP" altLang="en-US" sz="2400"/>
+              </a:p>
+            </p:txBody>
+          </p:sp>
           <p:sp>
             <p:nvSpPr>
               <p:cNvPr id="116" name="正方形/長方形 115">
@@ -9960,7 +10015,7 @@
             </p:nvSpPr>
             <p:spPr>
               <a:xfrm>
-                <a:off x="4871864" y="2417333"/>
+                <a:off x="4900997" y="2417333"/>
                 <a:ext cx="678178" cy="2098432"/>
               </a:xfrm>
               <a:prstGeom prst="rect">
@@ -10619,7 +10674,7 @@
             <p:spPr>
               <a:xfrm>
                 <a:off x="4867574" y="4005064"/>
-                <a:ext cx="448026" cy="343311"/>
+                <a:ext cx="365384" cy="299378"/>
               </a:xfrm>
               <a:prstGeom prst="rect">
                 <a:avLst/>
@@ -10644,7 +10699,7 @@
                     <a:latin typeface="Times New Roman" panose="02020603050405020304" pitchFamily="18" charset="0"/>
                     <a:cs typeface="Times New Roman" panose="02020603050405020304" pitchFamily="18" charset="0"/>
                   </a:rPr>
-                  <a:t>N</a:t>
+                  <a:t>n</a:t>
                 </a:r>
                 <a:endParaRPr kumimoji="1" lang="ja-JP" altLang="en-US" sz="2400" baseline="-25000">
                   <a:latin typeface="Times New Roman" panose="02020603050405020304" pitchFamily="18" charset="0"/>
@@ -10777,7 +10832,7 @@
               <p:spPr>
                 <a:xfrm>
                   <a:off x="3981870" y="4117847"/>
-                  <a:ext cx="254433" cy="299378"/>
+                  <a:ext cx="258127" cy="299378"/>
                 </a:xfrm>
                 <a:prstGeom prst="rect">
                   <a:avLst/>
@@ -10798,7 +10853,7 @@
                     <a:t>D</a:t>
                   </a:r>
                   <a:r>
-                    <a:rPr lang="en-US" altLang="ja-JP" sz="2400" b="1" i="1" baseline="-25000">
+                    <a:rPr lang="en-US" altLang="ja-JP" sz="2400" b="1" baseline="-25000">
                       <a:latin typeface="Times New Roman" panose="02020603050405020304" pitchFamily="18" charset="0"/>
                       <a:cs typeface="Times New Roman" panose="02020603050405020304" pitchFamily="18" charset="0"/>
                     </a:rPr>
@@ -10918,13 +10973,14 @@
                 </p:cNvPr>
                 <p:cNvCxnSpPr>
                   <a:cxnSpLocks/>
+                  <a:stCxn id="100" idx="1"/>
                 </p:cNvCxnSpPr>
                 <p:nvPr/>
               </p:nvCxnSpPr>
               <p:spPr>
                 <a:xfrm flipH="1">
-                  <a:off x="4240930" y="2399924"/>
-                  <a:ext cx="3146" cy="1418462"/>
+                  <a:off x="4240930" y="3208648"/>
+                  <a:ext cx="0" cy="609737"/>
                 </a:xfrm>
                 <a:prstGeom prst="straightConnector1">
                   <a:avLst/>
@@ -10970,7 +11026,7 @@
               <p:spPr>
                 <a:xfrm>
                   <a:off x="3667216" y="3778607"/>
-                  <a:ext cx="373990" cy="343311"/>
+                  <a:ext cx="331935" cy="299378"/>
                 </a:xfrm>
                 <a:prstGeom prst="rect">
                   <a:avLst/>
@@ -10984,11 +11040,18 @@
                 <a:lstStyle/>
                 <a:p>
                   <a:r>
+                    <a:rPr kumimoji="1" lang="en-US" altLang="ja-JP" sz="2400" b="1">
+                      <a:latin typeface="Times New Roman" panose="02020603050405020304" pitchFamily="18" charset="0"/>
+                      <a:cs typeface="Times New Roman" panose="02020603050405020304" pitchFamily="18" charset="0"/>
+                    </a:rPr>
+                    <a:t>min</a:t>
+                  </a:r>
+                  <a:r>
                     <a:rPr kumimoji="1" lang="en-US" altLang="ja-JP" sz="2400" b="1" i="1">
                       <a:latin typeface="Times New Roman" panose="02020603050405020304" pitchFamily="18" charset="0"/>
                       <a:cs typeface="Times New Roman" panose="02020603050405020304" pitchFamily="18" charset="0"/>
                     </a:rPr>
-                    <a:t>min T</a:t>
+                    <a:t> T</a:t>
                   </a:r>
                   <a:r>
                     <a:rPr kumimoji="1" lang="en-US" altLang="ja-JP" sz="2400" b="1" i="1" baseline="-25000">
@@ -11019,7 +11082,7 @@
               <p:spPr>
                 <a:xfrm>
                   <a:off x="4085163" y="3778607"/>
-                  <a:ext cx="393353" cy="343311"/>
+                  <a:ext cx="348820" cy="299378"/>
                 </a:xfrm>
                 <a:prstGeom prst="rect">
                   <a:avLst/>
@@ -11033,11 +11096,18 @@
                 <a:lstStyle/>
                 <a:p>
                   <a:r>
+                    <a:rPr kumimoji="1" lang="en-US" altLang="ja-JP" sz="2400" b="1">
+                      <a:latin typeface="Times New Roman" panose="02020603050405020304" pitchFamily="18" charset="0"/>
+                      <a:cs typeface="Times New Roman" panose="02020603050405020304" pitchFamily="18" charset="0"/>
+                    </a:rPr>
+                    <a:t>max</a:t>
+                  </a:r>
+                  <a:r>
                     <a:rPr kumimoji="1" lang="en-US" altLang="ja-JP" sz="2400" b="1" i="1">
                       <a:latin typeface="Times New Roman" panose="02020603050405020304" pitchFamily="18" charset="0"/>
                       <a:cs typeface="Times New Roman" panose="02020603050405020304" pitchFamily="18" charset="0"/>
                     </a:rPr>
-                    <a:t>max T</a:t>
+                    <a:t> T</a:t>
                   </a:r>
                   <a:r>
                     <a:rPr kumimoji="1" lang="en-US" altLang="ja-JP" sz="2400" b="1" i="1" baseline="-25000">
@@ -11068,8 +11138,8 @@
             </p:nvSpPr>
             <p:spPr>
               <a:xfrm>
-                <a:off x="5752022" y="3604025"/>
-                <a:ext cx="3299931" cy="299378"/>
+                <a:off x="6174644" y="3694653"/>
+                <a:ext cx="2856457" cy="299378"/>
               </a:xfrm>
               <a:prstGeom prst="rect">
                 <a:avLst/>
@@ -11082,13 +11152,6 @@
               </a:bodyPr>
               <a:lstStyle/>
               <a:p>
-                <a:r>
-                  <a:rPr kumimoji="1" lang="en-US" altLang="ja-JP" sz="2400" b="1" i="1">
-                    <a:latin typeface="Times New Roman" panose="02020603050405020304" pitchFamily="18" charset="0"/>
-                    <a:cs typeface="Times New Roman" panose="02020603050405020304" pitchFamily="18" charset="0"/>
-                  </a:rPr>
-                  <a:t>(1)   </a:t>
-                </a:r>
                 <a:r>
                   <a:rPr kumimoji="1" lang="en-US" altLang="ja-JP" sz="2400" b="1">
                     <a:latin typeface="Times New Roman" panose="02020603050405020304" pitchFamily="18" charset="0"/>
@@ -11168,7 +11231,7 @@
                   <a:t>+ D</a:t>
                 </a:r>
                 <a:r>
-                  <a:rPr lang="en-US" altLang="ja-JP" sz="2400" b="1" i="1" baseline="-25000">
+                  <a:rPr lang="en-US" altLang="ja-JP" sz="2400" b="1" baseline="-25000">
                     <a:latin typeface="Times New Roman" panose="02020603050405020304" pitchFamily="18" charset="0"/>
                     <a:cs typeface="Times New Roman" panose="02020603050405020304" pitchFamily="18" charset="0"/>
                   </a:rPr>
@@ -11195,8 +11258,8 @@
             </p:nvSpPr>
             <p:spPr>
               <a:xfrm>
-                <a:off x="5795709" y="3321091"/>
-                <a:ext cx="2760815" cy="299378"/>
+                <a:off x="5795707" y="3321091"/>
+                <a:ext cx="4168277" cy="299378"/>
               </a:xfrm>
               <a:prstGeom prst="rect">
                 <a:avLst/>
@@ -11218,7 +11281,7 @@
                     <a:latin typeface="Times New Roman" panose="02020603050405020304" pitchFamily="18" charset="0"/>
                     <a:cs typeface="Times New Roman" panose="02020603050405020304" pitchFamily="18" charset="0"/>
                   </a:rPr>
-                  <a:t>Core</a:t>
+                  <a:t>(1) Core</a:t>
                 </a:r>
                 <a:r>
                   <a:rPr kumimoji="1" lang="en-US" altLang="ja-JP" sz="2400" b="1" i="1" baseline="-25000">
@@ -11232,7 +11295,7 @@
                     <a:latin typeface="Times New Roman" panose="02020603050405020304" pitchFamily="18" charset="0"/>
                     <a:cs typeface="Times New Roman" panose="02020603050405020304" pitchFamily="18" charset="0"/>
                   </a:rPr>
-                  <a:t> lives in this timezone.</a:t>
+                  <a:t>exists in this time difference.</a:t>
                 </a:r>
                 <a:endParaRPr kumimoji="1" lang="ja-JP" altLang="en-US" sz="2400" baseline="-25000">
                   <a:latin typeface="Times New Roman" panose="02020603050405020304" pitchFamily="18" charset="0"/>
@@ -11259,7 +11322,7 @@
             </p:nvCxnSpPr>
             <p:spPr>
               <a:xfrm>
-                <a:off x="5795709" y="3470780"/>
+                <a:off x="5795707" y="3470780"/>
                 <a:ext cx="0" cy="0"/>
               </a:xfrm>
               <a:prstGeom prst="line">
@@ -11299,8 +11362,8 @@
             </p:nvCxnSpPr>
             <p:spPr>
               <a:xfrm flipH="1" flipV="1">
-                <a:off x="5550042" y="3466549"/>
-                <a:ext cx="245667" cy="4231"/>
+                <a:off x="5579174" y="3466549"/>
+                <a:ext cx="216533" cy="4231"/>
               </a:xfrm>
               <a:prstGeom prst="line">
                 <a:avLst/>
@@ -11342,8 +11405,8 @@
             </p:nvSpPr>
             <p:spPr>
               <a:xfrm>
-                <a:off x="5715472" y="4818103"/>
-                <a:ext cx="3132134" cy="299378"/>
+                <a:off x="6155164" y="4862035"/>
+                <a:ext cx="2862194" cy="299378"/>
               </a:xfrm>
               <a:prstGeom prst="rect">
                 <a:avLst/>
@@ -11361,7 +11424,7 @@
                     <a:latin typeface="Times New Roman" panose="02020603050405020304" pitchFamily="18" charset="0"/>
                     <a:cs typeface="Times New Roman" panose="02020603050405020304" pitchFamily="18" charset="0"/>
                   </a:rPr>
-                  <a:t>(2)    |T</a:t>
+                  <a:t>|T</a:t>
                 </a:r>
                 <a:r>
                   <a:rPr kumimoji="1" lang="en-US" altLang="ja-JP" sz="2400" b="1" i="1" baseline="-25000">
@@ -11403,11 +11466,18 @@
                   <a:t>D</a:t>
                 </a:r>
                 <a:r>
+                  <a:rPr lang="en-US" altLang="ja-JP" sz="2400" b="1" baseline="-25000">
+                    <a:latin typeface="Times New Roman" panose="02020603050405020304" pitchFamily="18" charset="0"/>
+                    <a:cs typeface="Times New Roman" panose="02020603050405020304" pitchFamily="18" charset="0"/>
+                  </a:rPr>
+                  <a:t>max</a:t>
+                </a:r>
+                <a:r>
                   <a:rPr lang="en-US" altLang="ja-JP" sz="2400" b="1" i="1" baseline="-25000">
                     <a:latin typeface="Times New Roman" panose="02020603050405020304" pitchFamily="18" charset="0"/>
                     <a:cs typeface="Times New Roman" panose="02020603050405020304" pitchFamily="18" charset="0"/>
                   </a:rPr>
-                  <a:t>max      </a:t>
+                  <a:t>            </a:t>
                 </a:r>
                 <a:r>
                   <a:rPr lang="en-US" altLang="ja-JP" sz="2400" b="1" i="1">
@@ -11451,20 +11521,19 @@
             </p:nvSpPr>
             <p:spPr>
               <a:xfrm>
-                <a:off x="5741575" y="4463348"/>
-                <a:ext cx="4168286" cy="299378"/>
+                <a:off x="5795719" y="4414289"/>
+                <a:ext cx="4168277" cy="299378"/>
               </a:xfrm>
               <a:prstGeom prst="rect">
                 <a:avLst/>
               </a:prstGeom>
-              <a:noFill/>
+              <a:solidFill>
+                <a:schemeClr val="bg1">
+                  <a:lumMod val="85000"/>
+                </a:schemeClr>
+              </a:solidFill>
               <a:ln>
-                <a:solidFill>
-                  <a:schemeClr val="tx1">
-                    <a:lumMod val="50000"/>
-                    <a:lumOff val="50000"/>
-                  </a:schemeClr>
-                </a:solidFill>
+                <a:noFill/>
                 <a:prstDash val="dash"/>
               </a:ln>
             </p:spPr>
@@ -11475,25 +11544,25 @@
               <a:lstStyle/>
               <a:p>
                 <a:r>
-                  <a:rPr lang="en-US" altLang="ja-JP" sz="2400" b="1" i="1">
-                    <a:latin typeface="Times New Roman" panose="02020603050405020304" pitchFamily="18" charset="0"/>
-                    <a:cs typeface="Times New Roman" panose="02020603050405020304" pitchFamily="18" charset="0"/>
-                  </a:rPr>
-                  <a:t>All </a:t>
-                </a:r>
-                <a:r>
                   <a:rPr kumimoji="1" lang="en-US" altLang="ja-JP" sz="2400" b="1" i="1">
                     <a:latin typeface="Times New Roman" panose="02020603050405020304" pitchFamily="18" charset="0"/>
                     <a:cs typeface="Times New Roman" panose="02020603050405020304" pitchFamily="18" charset="0"/>
                   </a:rPr>
-                  <a:t>Assets live within d</a:t>
+                  <a:t>(2) Assets exist within D</a:t>
+                </a:r>
+                <a:r>
+                  <a:rPr lang="en-US" altLang="ja-JP" sz="2400" b="1" baseline="-25000">
+                    <a:latin typeface="Times New Roman" panose="02020603050405020304" pitchFamily="18" charset="0"/>
+                    <a:cs typeface="Times New Roman" panose="02020603050405020304" pitchFamily="18" charset="0"/>
+                  </a:rPr>
+                  <a:t>max</a:t>
                 </a:r>
                 <a:r>
                   <a:rPr lang="en-US" altLang="ja-JP" sz="2400" b="1" i="1" baseline="-25000">
                     <a:latin typeface="Times New Roman" panose="02020603050405020304" pitchFamily="18" charset="0"/>
                     <a:cs typeface="Times New Roman" panose="02020603050405020304" pitchFamily="18" charset="0"/>
                   </a:rPr>
-                  <a:t>max </a:t>
+                  <a:t> </a:t>
                 </a:r>
                 <a:r>
                   <a:rPr lang="en-US" altLang="ja-JP" sz="2400" b="1" i="1">
@@ -11506,59 +11575,6 @@
                   <a:latin typeface="Times New Roman" panose="02020603050405020304" pitchFamily="18" charset="0"/>
                   <a:cs typeface="Times New Roman" panose="02020603050405020304" pitchFamily="18" charset="0"/>
                 </a:endParaRPr>
-              </a:p>
-            </p:txBody>
-          </p:sp>
-          <p:sp>
-            <p:nvSpPr>
-              <p:cNvPr id="64" name="正方形/長方形 63">
-                <a:extLst>
-                  <a:ext uri="{FF2B5EF4-FFF2-40B4-BE49-F238E27FC236}">
-                    <a16:creationId xmlns:a16="http://schemas.microsoft.com/office/drawing/2014/main" id="{3F8E8A93-3F33-EF25-0A6E-039462A788C0}"/>
-                  </a:ext>
-                </a:extLst>
-              </p:cNvPr>
-              <p:cNvSpPr/>
-              <p:nvPr/>
-            </p:nvSpPr>
-            <p:spPr>
-              <a:xfrm>
-                <a:off x="3924944" y="2335894"/>
-                <a:ext cx="1648967" cy="2318044"/>
-              </a:xfrm>
-              <a:prstGeom prst="rect">
-                <a:avLst/>
-              </a:prstGeom>
-              <a:noFill/>
-              <a:ln>
-                <a:solidFill>
-                  <a:schemeClr val="tx1"/>
-                </a:solidFill>
-                <a:prstDash val="dash"/>
-                <a:headEnd type="none"/>
-                <a:tailEnd type="none"/>
-              </a:ln>
-            </p:spPr>
-            <p:style>
-              <a:lnRef idx="1">
-                <a:schemeClr val="accent1"/>
-              </a:lnRef>
-              <a:fillRef idx="0">
-                <a:schemeClr val="accent1"/>
-              </a:fillRef>
-              <a:effectRef idx="0">
-                <a:schemeClr val="accent1"/>
-              </a:effectRef>
-              <a:fontRef idx="minor">
-                <a:schemeClr val="tx1"/>
-              </a:fontRef>
-            </p:style>
-            <p:txBody>
-              <a:bodyPr rtlCol="0" anchor="ctr"/>
-              <a:lstStyle/>
-              <a:p>
-                <a:pPr algn="ctr"/>
-                <a:endParaRPr kumimoji="1" lang="ja-JP" altLang="en-US" sz="2400"/>
               </a:p>
             </p:txBody>
           </p:sp>
@@ -11578,9 +11594,9 @@
               <p:nvPr/>
             </p:nvCxnSpPr>
             <p:spPr>
-              <a:xfrm flipH="1" flipV="1">
-                <a:off x="5579175" y="4601070"/>
-                <a:ext cx="162400" cy="11967"/>
+              <a:xfrm flipH="1">
+                <a:off x="5566648" y="4563978"/>
+                <a:ext cx="229071" cy="0"/>
               </a:xfrm>
               <a:prstGeom prst="line">
                 <a:avLst/>
@@ -11608,6 +11624,52 @@
               </a:fontRef>
             </p:style>
           </p:cxnSp>
+          <p:sp>
+            <p:nvSpPr>
+              <p:cNvPr id="10" name="テキスト ボックス 9">
+                <a:extLst>
+                  <a:ext uri="{FF2B5EF4-FFF2-40B4-BE49-F238E27FC236}">
+                    <a16:creationId xmlns:a16="http://schemas.microsoft.com/office/drawing/2014/main" id="{DBCDD710-0375-2E7C-B95E-FB76CD27B138}"/>
+                  </a:ext>
+                </a:extLst>
+              </p:cNvPr>
+              <p:cNvSpPr txBox="1"/>
+              <p:nvPr/>
+            </p:nvSpPr>
+            <p:spPr>
+              <a:xfrm>
+                <a:off x="5756671" y="2749962"/>
+                <a:ext cx="4207328" cy="299378"/>
+              </a:xfrm>
+              <a:prstGeom prst="rect">
+                <a:avLst/>
+              </a:prstGeom>
+              <a:noFill/>
+              <a:ln>
+                <a:noFill/>
+                <a:prstDash val="dash"/>
+              </a:ln>
+            </p:spPr>
+            <p:txBody>
+              <a:bodyPr wrap="square" rtlCol="0">
+                <a:spAutoFit/>
+              </a:bodyPr>
+              <a:lstStyle/>
+              <a:p>
+                <a:r>
+                  <a:rPr kumimoji="1" lang="en-US" altLang="ja-JP" sz="2400" b="1" i="1">
+                    <a:latin typeface="Times New Roman" panose="02020603050405020304" pitchFamily="18" charset="0"/>
+                    <a:cs typeface="Times New Roman" panose="02020603050405020304" pitchFamily="18" charset="0"/>
+                  </a:rPr>
+                  <a:t>At any point of wall time, (1) and (2) hold.</a:t>
+                </a:r>
+                <a:endParaRPr kumimoji="1" lang="ja-JP" altLang="en-US" sz="2400">
+                  <a:latin typeface="Times New Roman" panose="02020603050405020304" pitchFamily="18" charset="0"/>
+                  <a:cs typeface="Times New Roman" panose="02020603050405020304" pitchFamily="18" charset="0"/>
+                </a:endParaRPr>
+              </a:p>
+            </p:txBody>
+          </p:sp>
         </p:grpSp>
         <p:cxnSp>
           <p:nvCxnSpPr>

</xml_diff>